<commit_message>
presentacion. faltan puntos 6 y 8
</commit_message>
<xml_diff>
--- a/Plantilla.pptx
+++ b/Plantilla.pptx
@@ -9,19 +9,20 @@
     <p:sldId id="257" r:id="rId3"/>
     <p:sldId id="266" r:id="rId4"/>
     <p:sldId id="265" r:id="rId5"/>
-    <p:sldId id="262" r:id="rId6"/>
-    <p:sldId id="264" r:id="rId7"/>
-    <p:sldId id="263" r:id="rId8"/>
-    <p:sldId id="269" r:id="rId9"/>
-    <p:sldId id="268" r:id="rId10"/>
-    <p:sldId id="267" r:id="rId11"/>
-    <p:sldId id="270" r:id="rId12"/>
-    <p:sldId id="271" r:id="rId13"/>
-    <p:sldId id="272" r:id="rId14"/>
-    <p:sldId id="273" r:id="rId15"/>
-    <p:sldId id="276" r:id="rId16"/>
-    <p:sldId id="275" r:id="rId17"/>
-    <p:sldId id="277" r:id="rId18"/>
+    <p:sldId id="278" r:id="rId6"/>
+    <p:sldId id="262" r:id="rId7"/>
+    <p:sldId id="264" r:id="rId8"/>
+    <p:sldId id="263" r:id="rId9"/>
+    <p:sldId id="269" r:id="rId10"/>
+    <p:sldId id="268" r:id="rId11"/>
+    <p:sldId id="267" r:id="rId12"/>
+    <p:sldId id="270" r:id="rId13"/>
+    <p:sldId id="271" r:id="rId14"/>
+    <p:sldId id="272" r:id="rId15"/>
+    <p:sldId id="273" r:id="rId16"/>
+    <p:sldId id="276" r:id="rId17"/>
+    <p:sldId id="275" r:id="rId18"/>
+    <p:sldId id="277" r:id="rId19"/>
   </p:sldIdLst>
   <p:sldSz cx="12192000" cy="6858000"/>
   <p:notesSz cx="6858000" cy="9144000"/>
@@ -298,7 +299,7 @@
             <a:fld id="{87DE6118-2437-4B30-8E3C-4D2BE6020583}" type="datetimeFigureOut">
               <a:rPr lang="en-US" smtClean="0"/>
               <a:pPr/>
-              <a:t>3/17/2019</a:t>
+              <a:t>3/18/2019</a:t>
             </a:fld>
             <a:endParaRPr lang="en-US" dirty="0"/>
           </a:p>
@@ -629,7 +630,7 @@
           <a:p>
             <a:fld id="{87DE6118-2437-4B30-8E3C-4D2BE6020583}" type="datetimeFigureOut">
               <a:rPr lang="en-US" smtClean="0"/>
-              <a:t>3/17/2019</a:t>
+              <a:t>3/18/2019</a:t>
             </a:fld>
             <a:endParaRPr lang="en-US" dirty="0"/>
           </a:p>
@@ -809,7 +810,7 @@
           <a:p>
             <a:fld id="{87DE6118-2437-4B30-8E3C-4D2BE6020583}" type="datetimeFigureOut">
               <a:rPr lang="en-US" smtClean="0"/>
-              <a:t>3/17/2019</a:t>
+              <a:t>3/18/2019</a:t>
             </a:fld>
             <a:endParaRPr lang="en-US" dirty="0"/>
           </a:p>
@@ -979,7 +980,7 @@
           <a:p>
             <a:fld id="{87DE6118-2437-4B30-8E3C-4D2BE6020583}" type="datetimeFigureOut">
               <a:rPr lang="en-US" smtClean="0"/>
-              <a:t>3/17/2019</a:t>
+              <a:t>3/18/2019</a:t>
             </a:fld>
             <a:endParaRPr lang="en-US" dirty="0"/>
           </a:p>
@@ -1257,7 +1258,7 @@
             <a:fld id="{87DE6118-2437-4B30-8E3C-4D2BE6020583}" type="datetimeFigureOut">
               <a:rPr lang="en-US" smtClean="0"/>
               <a:pPr/>
-              <a:t>3/17/2019</a:t>
+              <a:t>3/18/2019</a:t>
             </a:fld>
             <a:endParaRPr lang="en-US" dirty="0"/>
           </a:p>
@@ -1652,7 +1653,7 @@
           <a:p>
             <a:fld id="{87DE6118-2437-4B30-8E3C-4D2BE6020583}" type="datetimeFigureOut">
               <a:rPr lang="en-US" smtClean="0"/>
-              <a:t>3/17/2019</a:t>
+              <a:t>3/18/2019</a:t>
             </a:fld>
             <a:endParaRPr lang="en-US" dirty="0"/>
           </a:p>
@@ -2129,7 +2130,7 @@
           <a:p>
             <a:fld id="{87DE6118-2437-4B30-8E3C-4D2BE6020583}" type="datetimeFigureOut">
               <a:rPr lang="en-US" smtClean="0"/>
-              <a:t>3/17/2019</a:t>
+              <a:t>3/18/2019</a:t>
             </a:fld>
             <a:endParaRPr lang="en-US" dirty="0"/>
           </a:p>
@@ -2247,7 +2248,7 @@
           <a:p>
             <a:fld id="{87DE6118-2437-4B30-8E3C-4D2BE6020583}" type="datetimeFigureOut">
               <a:rPr lang="en-US" smtClean="0"/>
-              <a:t>3/17/2019</a:t>
+              <a:t>3/18/2019</a:t>
             </a:fld>
             <a:endParaRPr lang="en-US" dirty="0"/>
           </a:p>
@@ -2342,7 +2343,7 @@
           <a:p>
             <a:fld id="{87DE6118-2437-4B30-8E3C-4D2BE6020583}" type="datetimeFigureOut">
               <a:rPr lang="en-US" smtClean="0"/>
-              <a:t>3/17/2019</a:t>
+              <a:t>3/18/2019</a:t>
             </a:fld>
             <a:endParaRPr lang="en-US" dirty="0"/>
           </a:p>
@@ -2689,7 +2690,7 @@
             <a:fld id="{87DE6118-2437-4B30-8E3C-4D2BE6020583}" type="datetimeFigureOut">
               <a:rPr lang="en-US" smtClean="0"/>
               <a:pPr/>
-              <a:t>3/17/2019</a:t>
+              <a:t>3/18/2019</a:t>
             </a:fld>
             <a:endParaRPr lang="en-US" dirty="0"/>
           </a:p>
@@ -3079,7 +3080,7 @@
             <a:fld id="{87DE6118-2437-4B30-8E3C-4D2BE6020583}" type="datetimeFigureOut">
               <a:rPr lang="en-US" smtClean="0"/>
               <a:pPr/>
-              <a:t>3/17/2019</a:t>
+              <a:t>3/18/2019</a:t>
             </a:fld>
             <a:endParaRPr lang="en-US" dirty="0"/>
           </a:p>
@@ -3359,7 +3360,7 @@
             <a:fld id="{87DE6118-2437-4B30-8E3C-4D2BE6020583}" type="datetimeFigureOut">
               <a:rPr lang="en-US" smtClean="0"/>
               <a:pPr/>
-              <a:t>3/17/2019</a:t>
+              <a:t>3/18/2019</a:t>
             </a:fld>
             <a:endParaRPr lang="en-US" dirty="0"/>
           </a:p>
@@ -4287,7 +4288,13 @@
               <a:rPr lang="es-ES" sz="2400" b="1" dirty="0">
                 <a:latin typeface="Century Gothic" panose="020B0502020202020204" pitchFamily="34" charset="0"/>
               </a:rPr>
-              <a:t>Tecnología específica: Laravel</a:t>
+              <a:t>Tecnología específica: </a:t>
+            </a:r>
+            <a:r>
+              <a:rPr lang="es-ES" sz="2400" b="1" dirty="0" err="1">
+                <a:latin typeface="Century Gothic" panose="020B0502020202020204" pitchFamily="34" charset="0"/>
+              </a:rPr>
+              <a:t>Yii</a:t>
             </a:r>
             <a:endParaRPr lang="es-ES" b="1" dirty="0">
               <a:latin typeface="Century Gothic" panose="020B0502020202020204" pitchFamily="34" charset="0"/>
@@ -4313,7 +4320,7 @@
         </p:nvSpPr>
         <p:spPr>
           <a:xfrm>
-            <a:off x="1874520" y="2171700"/>
+            <a:off x="2868191" y="2074794"/>
             <a:ext cx="9601200" cy="483704"/>
           </a:xfrm>
         </p:spPr>
@@ -4323,15 +4330,24 @@
           </a:bodyPr>
           <a:lstStyle/>
           <a:p>
-            <a:pPr marL="0" indent="0" algn="ctr">
+            <a:pPr marL="0" indent="0">
               <a:buNone/>
             </a:pPr>
             <a:r>
               <a:rPr lang="es-ES" sz="2400" b="1" dirty="0">
                 <a:latin typeface="Century Gothic" panose="020B0502020202020204" pitchFamily="34" charset="0"/>
               </a:rPr>
-              <a:t>Herramientas utilizadas:</a:t>
-            </a:r>
+              <a:t>Herramientas utilizadas: Google y Google </a:t>
+            </a:r>
+            <a:r>
+              <a:rPr lang="es-ES" sz="2400" b="1" dirty="0" err="1">
+                <a:latin typeface="Century Gothic" panose="020B0502020202020204" pitchFamily="34" charset="0"/>
+              </a:rPr>
+              <a:t>Scholar</a:t>
+            </a:r>
+            <a:endParaRPr lang="es-ES" sz="2400" b="1" dirty="0">
+              <a:latin typeface="Century Gothic" panose="020B0502020202020204" pitchFamily="34" charset="0"/>
+            </a:endParaRPr>
           </a:p>
         </p:txBody>
       </p:sp>
@@ -4558,35 +4574,712 @@
               <a:buFont typeface="+mj-lt"/>
               <a:buAutoNum type="arabicPeriod"/>
             </a:pPr>
+            <a:endParaRPr lang="es-ES" sz="2400" b="1" dirty="0">
+              <a:solidFill>
+                <a:schemeClr val="tx1"/>
+              </a:solidFill>
+              <a:latin typeface="Century Gothic" panose="020B0502020202020204" pitchFamily="34" charset="0"/>
+            </a:endParaRPr>
+          </a:p>
+        </p:txBody>
+      </p:sp>
+      <p:pic>
+        <p:nvPicPr>
+          <p:cNvPr id="2050" name="Picture 2" descr="Resultado de imagen de yii png">
+            <a:extLst>
+              <a:ext uri="{FF2B5EF4-FFF2-40B4-BE49-F238E27FC236}">
+                <a16:creationId xmlns:a16="http://schemas.microsoft.com/office/drawing/2014/main" id="{A48B450D-3AF0-429C-A374-BB09532B021B}"/>
+              </a:ext>
+            </a:extLst>
+          </p:cNvPr>
+          <p:cNvPicPr>
+            <a:picLocks noChangeAspect="1" noChangeArrowheads="1"/>
+          </p:cNvPicPr>
+          <p:nvPr/>
+        </p:nvPicPr>
+        <p:blipFill>
+          <a:blip r:embed="rId2">
+            <a:extLst>
+              <a:ext uri="{28A0092B-C50C-407E-A947-70E740481C1C}">
+                <a14:useLocalDpi xmlns:a14="http://schemas.microsoft.com/office/drawing/2010/main" val="0"/>
+              </a:ext>
+            </a:extLst>
+          </a:blip>
+          <a:srcRect/>
+          <a:stretch>
+            <a:fillRect/>
+          </a:stretch>
+        </p:blipFill>
+        <p:spPr bwMode="auto">
+          <a:xfrm>
+            <a:off x="9885045" y="0"/>
+            <a:ext cx="2175510" cy="2175510"/>
+          </a:xfrm>
+          <a:prstGeom prst="rect">
+            <a:avLst/>
+          </a:prstGeom>
+          <a:noFill/>
+          <a:extLst>
+            <a:ext uri="{909E8E84-426E-40DD-AFC4-6F175D3DCCD1}">
+              <a14:hiddenFill xmlns:a14="http://schemas.microsoft.com/office/drawing/2010/main">
+                <a:solidFill>
+                  <a:srgbClr val="FFFFFF"/>
+                </a:solidFill>
+              </a14:hiddenFill>
+            </a:ext>
+          </a:extLst>
+        </p:spPr>
+      </p:pic>
+      <p:pic>
+        <p:nvPicPr>
+          <p:cNvPr id="4" name="Imagen 3">
+            <a:extLst>
+              <a:ext uri="{FF2B5EF4-FFF2-40B4-BE49-F238E27FC236}">
+                <a16:creationId xmlns:a16="http://schemas.microsoft.com/office/drawing/2014/main" id="{4E791050-30B4-4905-8D1E-03F6A25F6E58}"/>
+              </a:ext>
+            </a:extLst>
+          </p:cNvPr>
+          <p:cNvPicPr>
+            <a:picLocks noChangeAspect="1"/>
+          </p:cNvPicPr>
+          <p:nvPr/>
+        </p:nvPicPr>
+        <p:blipFill>
+          <a:blip r:embed="rId3"/>
+          <a:stretch>
+            <a:fillRect/>
+          </a:stretch>
+        </p:blipFill>
+        <p:spPr>
+          <a:xfrm>
+            <a:off x="846161" y="3162614"/>
+            <a:ext cx="3296487" cy="784878"/>
+          </a:xfrm>
+          <a:prstGeom prst="rect">
+            <a:avLst/>
+          </a:prstGeom>
+        </p:spPr>
+      </p:pic>
+      <p:sp>
+        <p:nvSpPr>
+          <p:cNvPr id="5" name="CuadroTexto 4">
+            <a:extLst>
+              <a:ext uri="{FF2B5EF4-FFF2-40B4-BE49-F238E27FC236}">
+                <a16:creationId xmlns:a16="http://schemas.microsoft.com/office/drawing/2014/main" id="{A34CA0B1-3855-4DDF-87E6-4DC257D1B064}"/>
+              </a:ext>
+            </a:extLst>
+          </p:cNvPr>
+          <p:cNvSpPr txBox="1"/>
+          <p:nvPr/>
+        </p:nvSpPr>
+        <p:spPr>
+          <a:xfrm>
+            <a:off x="846161" y="4053385"/>
+            <a:ext cx="3684896" cy="1477328"/>
+          </a:xfrm>
+          <a:prstGeom prst="rect">
+            <a:avLst/>
+          </a:prstGeom>
+          <a:noFill/>
+        </p:spPr>
+        <p:txBody>
+          <a:bodyPr wrap="square" rtlCol="0">
+            <a:spAutoFit/>
+          </a:bodyPr>
+          <a:lstStyle/>
+          <a:p>
+            <a:r>
+              <a:rPr lang="es-ES_tradnl"/>
+              <a:t>Nombre del curso: Curso de Desarrollo Backend con PHP y Yii 2</a:t>
+            </a:r>
+          </a:p>
+          <a:p>
+            <a:r>
+              <a:rPr lang="es-ES_tradnl"/>
+              <a:t>Duración: 10 horas</a:t>
+            </a:r>
+          </a:p>
+          <a:p>
+            <a:r>
+              <a:rPr lang="es-ES_tradnl"/>
+              <a:t>Posibilidad de prácticas: No</a:t>
+            </a:r>
+          </a:p>
+          <a:p>
+            <a:r>
+              <a:rPr lang="es-ES_tradnl"/>
+              <a:t>Precio: 7 euros / mes</a:t>
+            </a:r>
+            <a:endParaRPr lang="es-ES_tradnl" dirty="0"/>
+          </a:p>
+        </p:txBody>
+      </p:sp>
+      <p:pic>
+        <p:nvPicPr>
+          <p:cNvPr id="6" name="Imagen 5">
+            <a:extLst>
+              <a:ext uri="{FF2B5EF4-FFF2-40B4-BE49-F238E27FC236}">
+                <a16:creationId xmlns:a16="http://schemas.microsoft.com/office/drawing/2014/main" id="{44802BCC-7E31-4D49-9839-19C366F8134C}"/>
+              </a:ext>
+            </a:extLst>
+          </p:cNvPr>
+          <p:cNvPicPr>
+            <a:picLocks noChangeAspect="1"/>
+          </p:cNvPicPr>
+          <p:nvPr/>
+        </p:nvPicPr>
+        <p:blipFill>
+          <a:blip r:embed="rId4"/>
+          <a:stretch>
+            <a:fillRect/>
+          </a:stretch>
+        </p:blipFill>
+        <p:spPr>
+          <a:xfrm>
+            <a:off x="5009992" y="3262387"/>
+            <a:ext cx="2631551" cy="1089992"/>
+          </a:xfrm>
+          <a:prstGeom prst="rect">
+            <a:avLst/>
+          </a:prstGeom>
+        </p:spPr>
+      </p:pic>
+      <p:sp>
+        <p:nvSpPr>
+          <p:cNvPr id="7" name="CuadroTexto 6">
+            <a:extLst>
+              <a:ext uri="{FF2B5EF4-FFF2-40B4-BE49-F238E27FC236}">
+                <a16:creationId xmlns:a16="http://schemas.microsoft.com/office/drawing/2014/main" id="{773397A1-8496-431F-B899-118B4049544A}"/>
+              </a:ext>
+            </a:extLst>
+          </p:cNvPr>
+          <p:cNvSpPr txBox="1"/>
+          <p:nvPr/>
+        </p:nvSpPr>
+        <p:spPr>
+          <a:xfrm>
+            <a:off x="4885899" y="4458461"/>
+            <a:ext cx="3289110" cy="1754326"/>
+          </a:xfrm>
+          <a:prstGeom prst="rect">
+            <a:avLst/>
+          </a:prstGeom>
+          <a:noFill/>
+        </p:spPr>
+        <p:txBody>
+          <a:bodyPr wrap="square" rtlCol="0">
+            <a:spAutoFit/>
+          </a:bodyPr>
+          <a:lstStyle/>
+          <a:p>
+            <a:r>
+              <a:rPr lang="es-ES_tradnl" dirty="0"/>
+              <a:t>Nombre del curso:  </a:t>
+            </a:r>
+            <a:r>
+              <a:rPr lang="es-ES_tradnl" dirty="0" err="1"/>
+              <a:t>Learning</a:t>
+            </a:r>
+            <a:r>
+              <a:rPr lang="es-ES_tradnl" dirty="0"/>
+              <a:t> </a:t>
+            </a:r>
+            <a:r>
+              <a:rPr lang="es-ES_tradnl" dirty="0" err="1"/>
+              <a:t>Path</a:t>
+            </a:r>
+            <a:r>
+              <a:rPr lang="es-ES_tradnl" dirty="0"/>
+              <a:t>: </a:t>
+            </a:r>
+            <a:r>
+              <a:rPr lang="es-ES_tradnl" dirty="0" err="1"/>
+              <a:t>Yii</a:t>
+            </a:r>
+            <a:r>
+              <a:rPr lang="es-ES_tradnl" dirty="0"/>
+              <a:t> 2: </a:t>
+            </a:r>
+            <a:r>
+              <a:rPr lang="es-ES_tradnl" dirty="0" err="1"/>
+              <a:t>Applications</a:t>
+            </a:r>
+            <a:r>
+              <a:rPr lang="es-ES_tradnl" dirty="0"/>
+              <a:t> </a:t>
+            </a:r>
+            <a:r>
+              <a:rPr lang="es-ES_tradnl" dirty="0" err="1"/>
+              <a:t>with</a:t>
+            </a:r>
+            <a:r>
+              <a:rPr lang="es-ES_tradnl" dirty="0"/>
+              <a:t> PHP</a:t>
+            </a:r>
+          </a:p>
+          <a:p>
+            <a:r>
+              <a:rPr lang="es-ES_tradnl" dirty="0"/>
+              <a:t>Duración: 10 horas</a:t>
+            </a:r>
+          </a:p>
+          <a:p>
+            <a:r>
+              <a:rPr lang="es-ES_tradnl" dirty="0"/>
+              <a:t>Posibilidad de prácticas: no</a:t>
+            </a:r>
+          </a:p>
+          <a:p>
+            <a:r>
+              <a:rPr lang="es-ES_tradnl" dirty="0"/>
+              <a:t>Precio: 13  euros</a:t>
+            </a:r>
+          </a:p>
+        </p:txBody>
+      </p:sp>
+      <p:pic>
+        <p:nvPicPr>
+          <p:cNvPr id="8" name="Imagen 7">
+            <a:extLst>
+              <a:ext uri="{FF2B5EF4-FFF2-40B4-BE49-F238E27FC236}">
+                <a16:creationId xmlns:a16="http://schemas.microsoft.com/office/drawing/2014/main" id="{F6DCA718-C5C3-4247-8FE8-FB9E17F93EA1}"/>
+              </a:ext>
+            </a:extLst>
+          </p:cNvPr>
+          <p:cNvPicPr>
+            <a:picLocks noChangeAspect="1"/>
+          </p:cNvPicPr>
+          <p:nvPr/>
+        </p:nvPicPr>
+        <p:blipFill>
+          <a:blip r:embed="rId5"/>
+          <a:stretch>
+            <a:fillRect/>
+          </a:stretch>
+        </p:blipFill>
+        <p:spPr>
+          <a:xfrm>
+            <a:off x="8515705" y="3162614"/>
+            <a:ext cx="3080440" cy="860122"/>
+          </a:xfrm>
+          <a:prstGeom prst="rect">
+            <a:avLst/>
+          </a:prstGeom>
+        </p:spPr>
+      </p:pic>
+      <p:sp>
+        <p:nvSpPr>
+          <p:cNvPr id="10" name="CuadroTexto 9">
+            <a:extLst>
+              <a:ext uri="{FF2B5EF4-FFF2-40B4-BE49-F238E27FC236}">
+                <a16:creationId xmlns:a16="http://schemas.microsoft.com/office/drawing/2014/main" id="{69BA907B-D634-4D65-991C-9064616F36E2}"/>
+              </a:ext>
+            </a:extLst>
+          </p:cNvPr>
+          <p:cNvSpPr txBox="1"/>
+          <p:nvPr/>
+        </p:nvSpPr>
+        <p:spPr>
+          <a:xfrm>
+            <a:off x="8508887" y="3928757"/>
+            <a:ext cx="3498897" cy="1754326"/>
+          </a:xfrm>
+          <a:prstGeom prst="rect">
+            <a:avLst/>
+          </a:prstGeom>
+          <a:noFill/>
+        </p:spPr>
+        <p:txBody>
+          <a:bodyPr wrap="square" rtlCol="0">
+            <a:spAutoFit/>
+          </a:bodyPr>
+          <a:lstStyle/>
+          <a:p>
+            <a:r>
+              <a:rPr lang="es-ES_tradnl" dirty="0"/>
+              <a:t>Nombre del curso:  Desarrollar aplicaciones Web con </a:t>
+            </a:r>
+            <a:r>
+              <a:rPr lang="es-ES_tradnl" dirty="0" err="1"/>
+              <a:t>Yii</a:t>
+            </a:r>
+            <a:r>
+              <a:rPr lang="es-ES_tradnl" dirty="0"/>
+              <a:t> 2</a:t>
+            </a:r>
+          </a:p>
+          <a:p>
+            <a:r>
+              <a:rPr lang="es-ES_tradnl" dirty="0"/>
+              <a:t>Duración: 14 horas</a:t>
+            </a:r>
+          </a:p>
+          <a:p>
+            <a:r>
+              <a:rPr lang="es-ES_tradnl" dirty="0"/>
+              <a:t>Posibilidad de prácticas:  no indicado</a:t>
+            </a:r>
+          </a:p>
+          <a:p>
+            <a:r>
+              <a:rPr lang="es-ES_tradnl" dirty="0"/>
+              <a:t>Precio: 3500 euros</a:t>
+            </a:r>
+          </a:p>
+        </p:txBody>
+      </p:sp>
+    </p:spTree>
+    <p:extLst>
+      <p:ext uri="{BB962C8B-B14F-4D97-AF65-F5344CB8AC3E}">
+        <p14:creationId xmlns:p14="http://schemas.microsoft.com/office/powerpoint/2010/main" val="323829413"/>
+      </p:ext>
+    </p:extLst>
+  </p:cSld>
+  <p:clrMapOvr>
+    <a:masterClrMapping/>
+  </p:clrMapOvr>
+</p:sld>
+</file>
+
+<file path=ppt/slides/slide11.xml><?xml version="1.0" encoding="utf-8"?>
+<p:sld xmlns:a="http://schemas.openxmlformats.org/drawingml/2006/main" xmlns:r="http://schemas.openxmlformats.org/officeDocument/2006/relationships" xmlns:p="http://schemas.openxmlformats.org/presentationml/2006/main">
+  <p:cSld>
+    <p:bg>
+      <p:bgPr>
+        <a:solidFill>
+          <a:srgbClr val="EBF1F5"/>
+        </a:solidFill>
+        <a:effectLst/>
+      </p:bgPr>
+    </p:bg>
+    <p:spTree>
+      <p:nvGrpSpPr>
+        <p:cNvPr id="1" name=""/>
+        <p:cNvGrpSpPr/>
+        <p:nvPr/>
+      </p:nvGrpSpPr>
+      <p:grpSpPr>
+        <a:xfrm>
+          <a:off x="0" y="0"/>
+          <a:ext cx="0" cy="0"/>
+          <a:chOff x="0" y="0"/>
+          <a:chExt cx="0" cy="0"/>
+        </a:xfrm>
+      </p:grpSpPr>
+      <p:sp>
+        <p:nvSpPr>
+          <p:cNvPr id="2" name="Título 1">
+            <a:extLst>
+              <a:ext uri="{FF2B5EF4-FFF2-40B4-BE49-F238E27FC236}">
+                <a16:creationId xmlns:a16="http://schemas.microsoft.com/office/drawing/2014/main" id="{67625ECE-3F3D-4827-8CD9-4C1D83085BDC}"/>
+              </a:ext>
+            </a:extLst>
+          </p:cNvPr>
+          <p:cNvSpPr>
+            <a:spLocks noGrp="1"/>
+          </p:cNvSpPr>
+          <p:nvPr>
+            <p:ph type="title"/>
+          </p:nvPr>
+        </p:nvSpPr>
+        <p:spPr/>
+        <p:txBody>
+          <a:bodyPr/>
+          <a:lstStyle/>
+          <a:p>
+            <a:r>
+              <a:rPr lang="es-ES" b="1" dirty="0">
+                <a:latin typeface="Century Gothic" panose="020B0502020202020204" pitchFamily="34" charset="0"/>
+              </a:rPr>
+              <a:t>Cursos NO gratuitos</a:t>
+            </a:r>
+            <a:br>
+              <a:rPr lang="es-ES" b="1" dirty="0">
+                <a:latin typeface="Century Gothic" panose="020B0502020202020204" pitchFamily="34" charset="0"/>
+              </a:rPr>
+            </a:br>
             <a:r>
               <a:rPr lang="es-ES" sz="2400" b="1" dirty="0">
-                <a:solidFill>
-                  <a:schemeClr val="tx1"/>
-                </a:solidFill>
-                <a:latin typeface="Century Gothic" panose="020B0502020202020204" pitchFamily="34" charset="0"/>
-              </a:rPr>
-              <a:t> </a:t>
-            </a:r>
-          </a:p>
-          <a:p>
-            <a:pPr marL="457200" indent="-457200">
-              <a:buFont typeface="+mj-lt"/>
-              <a:buAutoNum type="arabicPeriod"/>
+                <a:latin typeface="Century Gothic" panose="020B0502020202020204" pitchFamily="34" charset="0"/>
+              </a:rPr>
+              <a:t>Tecnología específica: Laravel</a:t>
+            </a:r>
+            <a:endParaRPr lang="es-ES" b="1" dirty="0">
+              <a:latin typeface="Century Gothic" panose="020B0502020202020204" pitchFamily="34" charset="0"/>
+            </a:endParaRPr>
+          </a:p>
+        </p:txBody>
+      </p:sp>
+      <p:sp>
+        <p:nvSpPr>
+          <p:cNvPr id="3" name="Marcador de contenido 2">
+            <a:extLst>
+              <a:ext uri="{FF2B5EF4-FFF2-40B4-BE49-F238E27FC236}">
+                <a16:creationId xmlns:a16="http://schemas.microsoft.com/office/drawing/2014/main" id="{E00791BC-910E-46E2-ACBE-7F7487770480}"/>
+              </a:ext>
+            </a:extLst>
+          </p:cNvPr>
+          <p:cNvSpPr>
+            <a:spLocks noGrp="1"/>
+          </p:cNvSpPr>
+          <p:nvPr>
+            <p:ph idx="1"/>
+          </p:nvPr>
+        </p:nvSpPr>
+        <p:spPr>
+          <a:xfrm>
+            <a:off x="1888168" y="2099476"/>
+            <a:ext cx="9601200" cy="483704"/>
+          </a:xfrm>
+        </p:spPr>
+        <p:txBody>
+          <a:bodyPr>
+            <a:normAutofit/>
+          </a:bodyPr>
+          <a:lstStyle/>
+          <a:p>
+            <a:pPr marL="0" indent="0" algn="ctr">
+              <a:buNone/>
             </a:pPr>
             <a:r>
               <a:rPr lang="es-ES" sz="2400" b="1" dirty="0">
-                <a:solidFill>
-                  <a:schemeClr val="tx1"/>
-                </a:solidFill>
-                <a:latin typeface="Century Gothic" panose="020B0502020202020204" pitchFamily="34" charset="0"/>
-              </a:rPr>
-              <a:t> </a:t>
-            </a:r>
-          </a:p>
-          <a:p>
-            <a:pPr marL="457200" indent="-457200">
-              <a:buFont typeface="+mj-lt"/>
-              <a:buAutoNum type="arabicPeriod"/>
+                <a:latin typeface="Century Gothic" panose="020B0502020202020204" pitchFamily="34" charset="0"/>
+              </a:rPr>
+              <a:t>Herramientas utilizadas: Google y Google </a:t>
+            </a:r>
+            <a:r>
+              <a:rPr lang="es-ES" sz="2400" b="1" dirty="0" err="1">
+                <a:latin typeface="Century Gothic" panose="020B0502020202020204" pitchFamily="34" charset="0"/>
+              </a:rPr>
+              <a:t>Scholar</a:t>
+            </a:r>
+            <a:endParaRPr lang="es-ES" sz="2400" b="1" dirty="0">
+              <a:latin typeface="Century Gothic" panose="020B0502020202020204" pitchFamily="34" charset="0"/>
+            </a:endParaRPr>
+          </a:p>
+        </p:txBody>
+      </p:sp>
+      <p:sp>
+        <p:nvSpPr>
+          <p:cNvPr id="9" name="Marcador de contenido 2">
+            <a:extLst>
+              <a:ext uri="{FF2B5EF4-FFF2-40B4-BE49-F238E27FC236}">
+                <a16:creationId xmlns:a16="http://schemas.microsoft.com/office/drawing/2014/main" id="{D1EFBA3E-5E6D-45BB-86A8-AE203160817B}"/>
+              </a:ext>
+            </a:extLst>
+          </p:cNvPr>
+          <p:cNvSpPr txBox="1">
+            <a:spLocks/>
+          </p:cNvSpPr>
+          <p:nvPr/>
+        </p:nvSpPr>
+        <p:spPr>
+          <a:xfrm>
+            <a:off x="1539240" y="3429000"/>
+            <a:ext cx="9601200" cy="2160103"/>
+          </a:xfrm>
+          <a:prstGeom prst="rect">
+            <a:avLst/>
+          </a:prstGeom>
+        </p:spPr>
+        <p:txBody>
+          <a:bodyPr vert="horz" lIns="91440" tIns="45720" rIns="91440" bIns="45720" rtlCol="0">
+            <a:normAutofit/>
+          </a:bodyPr>
+          <a:lstStyle>
+            <a:lvl1pPr marL="384048" indent="-384048" algn="l" defTabSz="914400" rtl="0" eaLnBrk="1" latinLnBrk="0" hangingPunct="1">
+              <a:lnSpc>
+                <a:spcPct val="94000"/>
+              </a:lnSpc>
+              <a:spcBef>
+                <a:spcPts val="1000"/>
+              </a:spcBef>
+              <a:spcAft>
+                <a:spcPts val="200"/>
+              </a:spcAft>
+              <a:buFont typeface="Franklin Gothic Book" panose="020B0503020102020204" pitchFamily="34" charset="0"/>
+              <a:buChar char="■"/>
+              <a:defRPr sz="2000" kern="1200" baseline="0">
+                <a:solidFill>
+                  <a:schemeClr val="tx2"/>
+                </a:solidFill>
+                <a:latin typeface="+mn-lt"/>
+                <a:ea typeface="+mn-ea"/>
+                <a:cs typeface="+mn-cs"/>
+              </a:defRPr>
+            </a:lvl1pPr>
+            <a:lvl2pPr marL="914400" indent="-384048" algn="l" defTabSz="914400" rtl="0" eaLnBrk="1" latinLnBrk="0" hangingPunct="1">
+              <a:lnSpc>
+                <a:spcPct val="94000"/>
+              </a:lnSpc>
+              <a:spcBef>
+                <a:spcPts val="500"/>
+              </a:spcBef>
+              <a:spcAft>
+                <a:spcPts val="200"/>
+              </a:spcAft>
+              <a:buFont typeface="Franklin Gothic Book" panose="020B0503020102020204" pitchFamily="34" charset="0"/>
+              <a:buChar char="–"/>
+              <a:defRPr sz="2000" i="1" kern="1200" baseline="0">
+                <a:solidFill>
+                  <a:schemeClr val="tx2"/>
+                </a:solidFill>
+                <a:latin typeface="+mn-lt"/>
+                <a:ea typeface="+mn-ea"/>
+                <a:cs typeface="+mn-cs"/>
+              </a:defRPr>
+            </a:lvl2pPr>
+            <a:lvl3pPr marL="1371600" indent="-384048" algn="l" defTabSz="914400" rtl="0" eaLnBrk="1" latinLnBrk="0" hangingPunct="1">
+              <a:lnSpc>
+                <a:spcPct val="94000"/>
+              </a:lnSpc>
+              <a:spcBef>
+                <a:spcPts val="500"/>
+              </a:spcBef>
+              <a:spcAft>
+                <a:spcPts val="200"/>
+              </a:spcAft>
+              <a:buFont typeface="Franklin Gothic Book" panose="020B0503020102020204" pitchFamily="34" charset="0"/>
+              <a:buChar char="■"/>
+              <a:defRPr sz="1800" kern="1200" baseline="0">
+                <a:solidFill>
+                  <a:schemeClr val="tx2"/>
+                </a:solidFill>
+                <a:latin typeface="+mn-lt"/>
+                <a:ea typeface="+mn-ea"/>
+                <a:cs typeface="+mn-cs"/>
+              </a:defRPr>
+            </a:lvl3pPr>
+            <a:lvl4pPr marL="1828800" indent="-384048" algn="l" defTabSz="914400" rtl="0" eaLnBrk="1" latinLnBrk="0" hangingPunct="1">
+              <a:lnSpc>
+                <a:spcPct val="94000"/>
+              </a:lnSpc>
+              <a:spcBef>
+                <a:spcPts val="500"/>
+              </a:spcBef>
+              <a:spcAft>
+                <a:spcPts val="200"/>
+              </a:spcAft>
+              <a:buFont typeface="Franklin Gothic Book" panose="020B0503020102020204" pitchFamily="34" charset="0"/>
+              <a:buChar char="–"/>
+              <a:defRPr sz="1800" i="1" kern="1200" baseline="0">
+                <a:solidFill>
+                  <a:schemeClr val="tx2"/>
+                </a:solidFill>
+                <a:latin typeface="+mn-lt"/>
+                <a:ea typeface="+mn-ea"/>
+                <a:cs typeface="+mn-cs"/>
+              </a:defRPr>
+            </a:lvl4pPr>
+            <a:lvl5pPr marL="2286000" indent="-384048" algn="l" defTabSz="914400" rtl="0" eaLnBrk="1" latinLnBrk="0" hangingPunct="1">
+              <a:lnSpc>
+                <a:spcPct val="94000"/>
+              </a:lnSpc>
+              <a:spcBef>
+                <a:spcPts val="500"/>
+              </a:spcBef>
+              <a:spcAft>
+                <a:spcPts val="200"/>
+              </a:spcAft>
+              <a:buFont typeface="Franklin Gothic Book" panose="020B0503020102020204" pitchFamily="34" charset="0"/>
+              <a:buChar char="■"/>
+              <a:defRPr sz="1600" kern="1200" baseline="0">
+                <a:solidFill>
+                  <a:schemeClr val="tx2"/>
+                </a:solidFill>
+                <a:latin typeface="+mn-lt"/>
+                <a:ea typeface="+mn-ea"/>
+                <a:cs typeface="+mn-cs"/>
+              </a:defRPr>
+            </a:lvl5pPr>
+            <a:lvl6pPr marL="2743200" indent="-384048" algn="l" defTabSz="914400" rtl="0" eaLnBrk="1" latinLnBrk="0" hangingPunct="1">
+              <a:lnSpc>
+                <a:spcPct val="94000"/>
+              </a:lnSpc>
+              <a:spcBef>
+                <a:spcPts val="500"/>
+              </a:spcBef>
+              <a:spcAft>
+                <a:spcPts val="200"/>
+              </a:spcAft>
+              <a:buFont typeface="Franklin Gothic Book" panose="020B0503020102020204" pitchFamily="34" charset="0"/>
+              <a:buChar char="–"/>
+              <a:defRPr sz="1600" i="1" kern="1200" baseline="0">
+                <a:solidFill>
+                  <a:schemeClr val="tx2"/>
+                </a:solidFill>
+                <a:latin typeface="+mn-lt"/>
+                <a:ea typeface="+mn-ea"/>
+                <a:cs typeface="+mn-cs"/>
+              </a:defRPr>
+            </a:lvl6pPr>
+            <a:lvl7pPr marL="3200400" indent="-384048" algn="l" defTabSz="914400" rtl="0" eaLnBrk="1" latinLnBrk="0" hangingPunct="1">
+              <a:lnSpc>
+                <a:spcPct val="94000"/>
+              </a:lnSpc>
+              <a:spcBef>
+                <a:spcPts val="500"/>
+              </a:spcBef>
+              <a:spcAft>
+                <a:spcPts val="200"/>
+              </a:spcAft>
+              <a:buFont typeface="Franklin Gothic Book" panose="020B0503020102020204" pitchFamily="34" charset="0"/>
+              <a:buChar char="■"/>
+              <a:defRPr sz="1400" kern="1200" baseline="0">
+                <a:solidFill>
+                  <a:schemeClr val="tx2"/>
+                </a:solidFill>
+                <a:latin typeface="+mn-lt"/>
+                <a:ea typeface="+mn-ea"/>
+                <a:cs typeface="+mn-cs"/>
+              </a:defRPr>
+            </a:lvl7pPr>
+            <a:lvl8pPr marL="3657600" indent="-384048" algn="l" defTabSz="914400" rtl="0" eaLnBrk="1" latinLnBrk="0" hangingPunct="1">
+              <a:lnSpc>
+                <a:spcPct val="94000"/>
+              </a:lnSpc>
+              <a:spcBef>
+                <a:spcPts val="500"/>
+              </a:spcBef>
+              <a:spcAft>
+                <a:spcPts val="200"/>
+              </a:spcAft>
+              <a:buFont typeface="Franklin Gothic Book" panose="020B0503020102020204" pitchFamily="34" charset="0"/>
+              <a:buChar char="–"/>
+              <a:defRPr sz="1400" i="1" kern="1200" baseline="0">
+                <a:solidFill>
+                  <a:schemeClr val="tx2"/>
+                </a:solidFill>
+                <a:latin typeface="+mn-lt"/>
+                <a:ea typeface="+mn-ea"/>
+                <a:cs typeface="+mn-cs"/>
+              </a:defRPr>
+            </a:lvl8pPr>
+            <a:lvl9pPr marL="4114800" indent="-384048" algn="l" defTabSz="914400" rtl="0" eaLnBrk="1" latinLnBrk="0" hangingPunct="1">
+              <a:lnSpc>
+                <a:spcPct val="94000"/>
+              </a:lnSpc>
+              <a:spcBef>
+                <a:spcPts val="500"/>
+              </a:spcBef>
+              <a:spcAft>
+                <a:spcPts val="200"/>
+              </a:spcAft>
+              <a:buFont typeface="Franklin Gothic Book" panose="020B0503020102020204" pitchFamily="34" charset="0"/>
+              <a:buChar char="■"/>
+              <a:defRPr sz="1400" kern="1200" baseline="0">
+                <a:solidFill>
+                  <a:schemeClr val="tx2"/>
+                </a:solidFill>
+                <a:latin typeface="+mn-lt"/>
+                <a:ea typeface="+mn-ea"/>
+                <a:cs typeface="+mn-cs"/>
+              </a:defRPr>
+            </a:lvl9pPr>
+          </a:lstStyle>
+          <a:p>
+            <a:pPr marL="0" indent="0">
+              <a:buNone/>
             </a:pPr>
             <a:r>
               <a:rPr lang="es-ES" sz="2400" b="1" dirty="0">
@@ -4647,6 +5340,257 @@
           </a:extLst>
         </p:spPr>
       </p:pic>
+      <p:pic>
+        <p:nvPicPr>
+          <p:cNvPr id="4" name="Imagen 3">
+            <a:extLst>
+              <a:ext uri="{FF2B5EF4-FFF2-40B4-BE49-F238E27FC236}">
+                <a16:creationId xmlns:a16="http://schemas.microsoft.com/office/drawing/2014/main" id="{9DFD0B65-57E2-40CD-A48F-DF30CA287AB6}"/>
+              </a:ext>
+            </a:extLst>
+          </p:cNvPr>
+          <p:cNvPicPr>
+            <a:picLocks noChangeAspect="1"/>
+          </p:cNvPicPr>
+          <p:nvPr/>
+        </p:nvPicPr>
+        <p:blipFill>
+          <a:blip r:embed="rId3"/>
+          <a:stretch>
+            <a:fillRect/>
+          </a:stretch>
+        </p:blipFill>
+        <p:spPr>
+          <a:xfrm>
+            <a:off x="1211694" y="3265954"/>
+            <a:ext cx="2141486" cy="837973"/>
+          </a:xfrm>
+          <a:prstGeom prst="rect">
+            <a:avLst/>
+          </a:prstGeom>
+        </p:spPr>
+      </p:pic>
+      <p:sp>
+        <p:nvSpPr>
+          <p:cNvPr id="5" name="CuadroTexto 4">
+            <a:extLst>
+              <a:ext uri="{FF2B5EF4-FFF2-40B4-BE49-F238E27FC236}">
+                <a16:creationId xmlns:a16="http://schemas.microsoft.com/office/drawing/2014/main" id="{C9D4DB16-1348-4D40-9967-D88995CE10C7}"/>
+              </a:ext>
+            </a:extLst>
+          </p:cNvPr>
+          <p:cNvSpPr txBox="1"/>
+          <p:nvPr/>
+        </p:nvSpPr>
+        <p:spPr>
+          <a:xfrm>
+            <a:off x="791570" y="4274821"/>
+            <a:ext cx="3411940" cy="1477328"/>
+          </a:xfrm>
+          <a:prstGeom prst="rect">
+            <a:avLst/>
+          </a:prstGeom>
+          <a:noFill/>
+        </p:spPr>
+        <p:txBody>
+          <a:bodyPr wrap="square" rtlCol="0">
+            <a:spAutoFit/>
+          </a:bodyPr>
+          <a:lstStyle/>
+          <a:p>
+            <a:r>
+              <a:rPr lang="es-ES_tradnl"/>
+              <a:t>Nombre del curso: Curso básico de Laravel </a:t>
+            </a:r>
+          </a:p>
+          <a:p>
+            <a:r>
+              <a:rPr lang="es-ES_tradnl"/>
+              <a:t>Duración: 7 horas</a:t>
+            </a:r>
+          </a:p>
+          <a:p>
+            <a:r>
+              <a:rPr lang="es-ES_tradnl"/>
+              <a:t>Posibilidad de prácticas: no</a:t>
+            </a:r>
+          </a:p>
+          <a:p>
+            <a:r>
+              <a:rPr lang="es-ES_tradnl"/>
+              <a:t>Precio: 10 euros/mes</a:t>
+            </a:r>
+            <a:endParaRPr lang="es-ES_tradnl" dirty="0"/>
+          </a:p>
+        </p:txBody>
+      </p:sp>
+      <p:pic>
+        <p:nvPicPr>
+          <p:cNvPr id="6" name="Imagen 5">
+            <a:extLst>
+              <a:ext uri="{FF2B5EF4-FFF2-40B4-BE49-F238E27FC236}">
+                <a16:creationId xmlns:a16="http://schemas.microsoft.com/office/drawing/2014/main" id="{B791B393-545B-4477-A141-E9AF8797F619}"/>
+              </a:ext>
+            </a:extLst>
+          </p:cNvPr>
+          <p:cNvPicPr>
+            <a:picLocks noChangeAspect="1"/>
+          </p:cNvPicPr>
+          <p:nvPr/>
+        </p:nvPicPr>
+        <p:blipFill>
+          <a:blip r:embed="rId4"/>
+          <a:stretch>
+            <a:fillRect/>
+          </a:stretch>
+        </p:blipFill>
+        <p:spPr>
+          <a:xfrm>
+            <a:off x="4785011" y="3528214"/>
+            <a:ext cx="2886964" cy="1092730"/>
+          </a:xfrm>
+          <a:prstGeom prst="rect">
+            <a:avLst/>
+          </a:prstGeom>
+        </p:spPr>
+      </p:pic>
+      <p:sp>
+        <p:nvSpPr>
+          <p:cNvPr id="7" name="CuadroTexto 6">
+            <a:extLst>
+              <a:ext uri="{FF2B5EF4-FFF2-40B4-BE49-F238E27FC236}">
+                <a16:creationId xmlns:a16="http://schemas.microsoft.com/office/drawing/2014/main" id="{15B20557-B447-4189-AF01-BAD214069B16}"/>
+              </a:ext>
+            </a:extLst>
+          </p:cNvPr>
+          <p:cNvSpPr txBox="1"/>
+          <p:nvPr/>
+        </p:nvSpPr>
+        <p:spPr>
+          <a:xfrm>
+            <a:off x="4633870" y="4720157"/>
+            <a:ext cx="3411940" cy="1477328"/>
+          </a:xfrm>
+          <a:prstGeom prst="rect">
+            <a:avLst/>
+          </a:prstGeom>
+          <a:noFill/>
+        </p:spPr>
+        <p:txBody>
+          <a:bodyPr wrap="square" rtlCol="0">
+            <a:spAutoFit/>
+          </a:bodyPr>
+          <a:lstStyle/>
+          <a:p>
+            <a:r>
+              <a:rPr lang="es-ES_tradnl" dirty="0"/>
+              <a:t>Nombre del curso: Desarrollo de aplicaciones Web con Laravel</a:t>
+            </a:r>
+          </a:p>
+          <a:p>
+            <a:r>
+              <a:rPr lang="es-ES_tradnl" dirty="0"/>
+              <a:t>Duración: 35 horas</a:t>
+            </a:r>
+          </a:p>
+          <a:p>
+            <a:r>
+              <a:rPr lang="es-ES_tradnl" dirty="0"/>
+              <a:t>Posibilidad de prácticas: no</a:t>
+            </a:r>
+          </a:p>
+          <a:p>
+            <a:r>
+              <a:rPr lang="es-ES_tradnl" dirty="0"/>
+              <a:t>Precio: 99 euros</a:t>
+            </a:r>
+          </a:p>
+        </p:txBody>
+      </p:sp>
+      <p:pic>
+        <p:nvPicPr>
+          <p:cNvPr id="8" name="Imagen 7">
+            <a:extLst>
+              <a:ext uri="{FF2B5EF4-FFF2-40B4-BE49-F238E27FC236}">
+                <a16:creationId xmlns:a16="http://schemas.microsoft.com/office/drawing/2014/main" id="{37C99EF9-D160-40B8-9A5A-5E49AC80C179}"/>
+              </a:ext>
+            </a:extLst>
+          </p:cNvPr>
+          <p:cNvPicPr>
+            <a:picLocks noChangeAspect="1"/>
+          </p:cNvPicPr>
+          <p:nvPr/>
+        </p:nvPicPr>
+        <p:blipFill>
+          <a:blip r:embed="rId5"/>
+          <a:stretch>
+            <a:fillRect/>
+          </a:stretch>
+        </p:blipFill>
+        <p:spPr>
+          <a:xfrm>
+            <a:off x="8686804" y="3150086"/>
+            <a:ext cx="2781182" cy="1315132"/>
+          </a:xfrm>
+          <a:prstGeom prst="rect">
+            <a:avLst/>
+          </a:prstGeom>
+        </p:spPr>
+      </p:pic>
+      <p:sp>
+        <p:nvSpPr>
+          <p:cNvPr id="10" name="CuadroTexto 9">
+            <a:extLst>
+              <a:ext uri="{FF2B5EF4-FFF2-40B4-BE49-F238E27FC236}">
+                <a16:creationId xmlns:a16="http://schemas.microsoft.com/office/drawing/2014/main" id="{CC6D6F28-2675-49B4-AEA1-DF3F34A560DD}"/>
+              </a:ext>
+            </a:extLst>
+          </p:cNvPr>
+          <p:cNvSpPr txBox="1"/>
+          <p:nvPr/>
+        </p:nvSpPr>
+        <p:spPr>
+          <a:xfrm>
+            <a:off x="8569992" y="4465218"/>
+            <a:ext cx="3411940" cy="1477328"/>
+          </a:xfrm>
+          <a:prstGeom prst="rect">
+            <a:avLst/>
+          </a:prstGeom>
+          <a:noFill/>
+        </p:spPr>
+        <p:txBody>
+          <a:bodyPr wrap="square" rtlCol="0">
+            <a:spAutoFit/>
+          </a:bodyPr>
+          <a:lstStyle/>
+          <a:p>
+            <a:r>
+              <a:rPr lang="es-ES_tradnl"/>
+              <a:t>Nombre del curso: Curso de Laravel 5.5</a:t>
+            </a:r>
+          </a:p>
+          <a:p>
+            <a:r>
+              <a:rPr lang="es-ES_tradnl"/>
+              <a:t>Duración: 7 horas</a:t>
+            </a:r>
+          </a:p>
+          <a:p>
+            <a:r>
+              <a:rPr lang="es-ES_tradnl"/>
+              <a:t>Posibilidad de prácticas: no</a:t>
+            </a:r>
+          </a:p>
+          <a:p>
+            <a:r>
+              <a:rPr lang="es-ES_tradnl"/>
+              <a:t>Precio: 10 euros</a:t>
+            </a:r>
+            <a:endParaRPr lang="es-ES_tradnl" dirty="0"/>
+          </a:p>
+        </p:txBody>
+      </p:sp>
     </p:spTree>
     <p:extLst>
       <p:ext uri="{BB962C8B-B14F-4D97-AF65-F5344CB8AC3E}">
@@ -4660,7 +5604,7 @@
 </p:sld>
 </file>
 
-<file path=ppt/slides/slide11.xml><?xml version="1.0" encoding="utf-8"?>
+<file path=ppt/slides/slide12.xml><?xml version="1.0" encoding="utf-8"?>
 <p:sld xmlns:a="http://schemas.openxmlformats.org/drawingml/2006/main" xmlns:r="http://schemas.openxmlformats.org/officeDocument/2006/relationships" xmlns:p="http://schemas.openxmlformats.org/presentationml/2006/main">
   <p:cSld>
     <p:bg>
@@ -4764,7 +5708,7 @@
               <a:rPr lang="es-ES" sz="2400" b="1" dirty="0">
                 <a:latin typeface="Century Gothic" panose="020B0502020202020204" pitchFamily="34" charset="0"/>
               </a:rPr>
-              <a:t>Herramientas utilizadas:</a:t>
+              <a:t>Herramientas utilizadas: Buscadores y metabuscadores</a:t>
             </a:r>
           </a:p>
         </p:txBody>
@@ -4988,39 +5932,8 @@
             </a:lvl9pPr>
           </a:lstStyle>
           <a:p>
-            <a:pPr marL="457200" indent="-457200">
-              <a:buFont typeface="+mj-lt"/>
-              <a:buAutoNum type="arabicPeriod"/>
-            </a:pPr>
-            <a:r>
-              <a:rPr lang="es-ES" sz="2400" b="1" dirty="0">
-                <a:solidFill>
-                  <a:schemeClr val="tx1"/>
-                </a:solidFill>
-                <a:latin typeface="Century Gothic" panose="020B0502020202020204" pitchFamily="34" charset="0"/>
-              </a:rPr>
-              <a:t> </a:t>
-            </a:r>
-          </a:p>
-          <a:p>
-            <a:pPr marL="457200" indent="-457200">
-              <a:buFont typeface="+mj-lt"/>
-              <a:buAutoNum type="arabicPeriod"/>
-            </a:pPr>
-            <a:r>
-              <a:rPr lang="es-ES" sz="2400" b="1" dirty="0">
-                <a:solidFill>
-                  <a:schemeClr val="tx1"/>
-                </a:solidFill>
-                <a:latin typeface="Century Gothic" panose="020B0502020202020204" pitchFamily="34" charset="0"/>
-              </a:rPr>
-              <a:t> </a:t>
-            </a:r>
-          </a:p>
-          <a:p>
-            <a:pPr marL="457200" indent="-457200">
-              <a:buFont typeface="+mj-lt"/>
-              <a:buAutoNum type="arabicPeriod"/>
+            <a:pPr marL="0" indent="0">
+              <a:buNone/>
             </a:pPr>
             <a:r>
               <a:rPr lang="es-ES" sz="2400" b="1" dirty="0">
@@ -5081,6 +5994,65 @@
           </a:extLst>
         </p:spPr>
       </p:pic>
+      <p:pic>
+        <p:nvPicPr>
+          <p:cNvPr id="4" name="Imagen 3">
+            <a:extLst>
+              <a:ext uri="{FF2B5EF4-FFF2-40B4-BE49-F238E27FC236}">
+                <a16:creationId xmlns:a16="http://schemas.microsoft.com/office/drawing/2014/main" id="{1AA1CABA-3973-4F06-B9BB-55B9341B473A}"/>
+              </a:ext>
+            </a:extLst>
+          </p:cNvPr>
+          <p:cNvPicPr>
+            <a:picLocks noChangeAspect="1"/>
+          </p:cNvPicPr>
+          <p:nvPr/>
+        </p:nvPicPr>
+        <p:blipFill>
+          <a:blip r:embed="rId3"/>
+          <a:stretch>
+            <a:fillRect/>
+          </a:stretch>
+        </p:blipFill>
+        <p:spPr>
+          <a:xfrm>
+            <a:off x="6452010" y="3003955"/>
+            <a:ext cx="5518533" cy="2932663"/>
+          </a:xfrm>
+          <a:prstGeom prst="rect">
+            <a:avLst/>
+          </a:prstGeom>
+        </p:spPr>
+      </p:pic>
+      <p:pic>
+        <p:nvPicPr>
+          <p:cNvPr id="5" name="Imagen 4">
+            <a:extLst>
+              <a:ext uri="{FF2B5EF4-FFF2-40B4-BE49-F238E27FC236}">
+                <a16:creationId xmlns:a16="http://schemas.microsoft.com/office/drawing/2014/main" id="{433D8267-E716-4CC0-B06D-CC45E96EE80A}"/>
+              </a:ext>
+            </a:extLst>
+          </p:cNvPr>
+          <p:cNvPicPr>
+            <a:picLocks noChangeAspect="1"/>
+          </p:cNvPicPr>
+          <p:nvPr/>
+        </p:nvPicPr>
+        <p:blipFill rotWithShape="1">
+          <a:blip r:embed="rId4"/>
+          <a:srcRect l="2952" t="931" r="12648" b="1325"/>
+          <a:stretch/>
+        </p:blipFill>
+        <p:spPr>
+          <a:xfrm>
+            <a:off x="1181099" y="3003954"/>
+            <a:ext cx="4792649" cy="2932663"/>
+          </a:xfrm>
+          <a:prstGeom prst="rect">
+            <a:avLst/>
+          </a:prstGeom>
+        </p:spPr>
+      </p:pic>
     </p:spTree>
     <p:extLst>
       <p:ext uri="{BB962C8B-B14F-4D97-AF65-F5344CB8AC3E}">
@@ -5094,7 +6066,7 @@
 </p:sld>
 </file>
 
-<file path=ppt/slides/slide12.xml><?xml version="1.0" encoding="utf-8"?>
+<file path=ppt/slides/slide13.xml><?xml version="1.0" encoding="utf-8"?>
 <p:sld xmlns:a="http://schemas.openxmlformats.org/drawingml/2006/main" xmlns:r="http://schemas.openxmlformats.org/officeDocument/2006/relationships" xmlns:p="http://schemas.openxmlformats.org/presentationml/2006/main">
   <p:cSld>
     <p:bg>
@@ -5204,7 +6176,7 @@
               <a:rPr lang="es-ES" sz="2400" b="1" dirty="0">
                 <a:latin typeface="Century Gothic" panose="020B0502020202020204" pitchFamily="34" charset="0"/>
               </a:rPr>
-              <a:t>Herramientas utilizadas:</a:t>
+              <a:t>Herramientas utilizadas: Buscadores y metabuscadores</a:t>
             </a:r>
           </a:p>
         </p:txBody>
@@ -5428,39 +6400,8 @@
             </a:lvl9pPr>
           </a:lstStyle>
           <a:p>
-            <a:pPr marL="457200" indent="-457200">
-              <a:buFont typeface="+mj-lt"/>
-              <a:buAutoNum type="arabicPeriod"/>
-            </a:pPr>
-            <a:r>
-              <a:rPr lang="es-ES" sz="2400" b="1" dirty="0">
-                <a:solidFill>
-                  <a:schemeClr val="tx1"/>
-                </a:solidFill>
-                <a:latin typeface="Century Gothic" panose="020B0502020202020204" pitchFamily="34" charset="0"/>
-              </a:rPr>
-              <a:t> </a:t>
-            </a:r>
-          </a:p>
-          <a:p>
-            <a:pPr marL="457200" indent="-457200">
-              <a:buFont typeface="+mj-lt"/>
-              <a:buAutoNum type="arabicPeriod"/>
-            </a:pPr>
-            <a:r>
-              <a:rPr lang="es-ES" sz="2400" b="1" dirty="0">
-                <a:solidFill>
-                  <a:schemeClr val="tx1"/>
-                </a:solidFill>
-                <a:latin typeface="Century Gothic" panose="020B0502020202020204" pitchFamily="34" charset="0"/>
-              </a:rPr>
-              <a:t> </a:t>
-            </a:r>
-          </a:p>
-          <a:p>
-            <a:pPr marL="457200" indent="-457200">
-              <a:buFont typeface="+mj-lt"/>
-              <a:buAutoNum type="arabicPeriod"/>
+            <a:pPr marL="0" indent="0">
+              <a:buNone/>
             </a:pPr>
             <a:r>
               <a:rPr lang="es-ES" sz="2400" b="1" dirty="0">
@@ -5521,6 +6462,66 @@
           </a:extLst>
         </p:spPr>
       </p:pic>
+      <p:pic>
+        <p:nvPicPr>
+          <p:cNvPr id="6" name="Imagen 5">
+            <a:extLst>
+              <a:ext uri="{FF2B5EF4-FFF2-40B4-BE49-F238E27FC236}">
+                <a16:creationId xmlns:a16="http://schemas.microsoft.com/office/drawing/2014/main" id="{C657D05F-6B60-4ED0-9C03-E585CC6A0D61}"/>
+              </a:ext>
+            </a:extLst>
+          </p:cNvPr>
+          <p:cNvPicPr>
+            <a:picLocks noChangeAspect="1"/>
+          </p:cNvPicPr>
+          <p:nvPr/>
+        </p:nvPicPr>
+        <p:blipFill>
+          <a:blip r:embed="rId3"/>
+          <a:stretch>
+            <a:fillRect/>
+          </a:stretch>
+        </p:blipFill>
+        <p:spPr>
+          <a:xfrm>
+            <a:off x="6932422" y="2661201"/>
+            <a:ext cx="4905375" cy="3695700"/>
+          </a:xfrm>
+          <a:prstGeom prst="rect">
+            <a:avLst/>
+          </a:prstGeom>
+        </p:spPr>
+      </p:pic>
+      <p:pic>
+        <p:nvPicPr>
+          <p:cNvPr id="7" name="Imagen 6">
+            <a:extLst>
+              <a:ext uri="{FF2B5EF4-FFF2-40B4-BE49-F238E27FC236}">
+                <a16:creationId xmlns:a16="http://schemas.microsoft.com/office/drawing/2014/main" id="{3F82026D-D102-4E18-842A-07F8BF59BF5B}"/>
+              </a:ext>
+            </a:extLst>
+          </p:cNvPr>
+          <p:cNvPicPr>
+            <a:picLocks noChangeAspect="1"/>
+          </p:cNvPicPr>
+          <p:nvPr/>
+        </p:nvPicPr>
+        <p:blipFill>
+          <a:blip r:embed="rId4"/>
+          <a:stretch>
+            <a:fillRect/>
+          </a:stretch>
+        </p:blipFill>
+        <p:spPr>
+          <a:xfrm>
+            <a:off x="1400175" y="2655404"/>
+            <a:ext cx="4695825" cy="3648075"/>
+          </a:xfrm>
+          <a:prstGeom prst="rect">
+            <a:avLst/>
+          </a:prstGeom>
+        </p:spPr>
+      </p:pic>
     </p:spTree>
     <p:extLst>
       <p:ext uri="{BB962C8B-B14F-4D97-AF65-F5344CB8AC3E}">
@@ -5534,7 +6535,7 @@
 </p:sld>
 </file>
 
-<file path=ppt/slides/slide13.xml><?xml version="1.0" encoding="utf-8"?>
+<file path=ppt/slides/slide14.xml><?xml version="1.0" encoding="utf-8"?>
 <p:sld xmlns:a="http://schemas.openxmlformats.org/drawingml/2006/main" xmlns:r="http://schemas.openxmlformats.org/officeDocument/2006/relationships" xmlns:p="http://schemas.openxmlformats.org/presentationml/2006/main">
   <p:cSld>
     <p:bg>
@@ -5638,7 +6639,7 @@
               <a:rPr lang="es-ES" sz="2400" b="1" dirty="0">
                 <a:latin typeface="Century Gothic" panose="020B0502020202020204" pitchFamily="34" charset="0"/>
               </a:rPr>
-              <a:t>Herramientas utilizadas:</a:t>
+              <a:t>Herramientas utilizadas: Buscadores y metabuscadores</a:t>
             </a:r>
           </a:p>
         </p:txBody>
@@ -5862,39 +6863,8 @@
             </a:lvl9pPr>
           </a:lstStyle>
           <a:p>
-            <a:pPr marL="457200" indent="-457200">
-              <a:buFont typeface="+mj-lt"/>
-              <a:buAutoNum type="arabicPeriod"/>
-            </a:pPr>
-            <a:r>
-              <a:rPr lang="es-ES" sz="2400" b="1" dirty="0">
-                <a:solidFill>
-                  <a:schemeClr val="tx1"/>
-                </a:solidFill>
-                <a:latin typeface="Century Gothic" panose="020B0502020202020204" pitchFamily="34" charset="0"/>
-              </a:rPr>
-              <a:t> </a:t>
-            </a:r>
-          </a:p>
-          <a:p>
-            <a:pPr marL="457200" indent="-457200">
-              <a:buFont typeface="+mj-lt"/>
-              <a:buAutoNum type="arabicPeriod"/>
-            </a:pPr>
-            <a:r>
-              <a:rPr lang="es-ES" sz="2400" b="1" dirty="0">
-                <a:solidFill>
-                  <a:schemeClr val="tx1"/>
-                </a:solidFill>
-                <a:latin typeface="Century Gothic" panose="020B0502020202020204" pitchFamily="34" charset="0"/>
-              </a:rPr>
-              <a:t> </a:t>
-            </a:r>
-          </a:p>
-          <a:p>
-            <a:pPr marL="457200" indent="-457200">
-              <a:buFont typeface="+mj-lt"/>
-              <a:buAutoNum type="arabicPeriod"/>
+            <a:pPr marL="0" indent="0">
+              <a:buNone/>
             </a:pPr>
             <a:r>
               <a:rPr lang="es-ES" sz="2400" b="1" dirty="0">
@@ -5955,329 +6925,68 @@
           </a:extLst>
         </p:spPr>
       </p:pic>
-    </p:spTree>
-    <p:extLst>
-      <p:ext uri="{BB962C8B-B14F-4D97-AF65-F5344CB8AC3E}">
-        <p14:creationId xmlns:p14="http://schemas.microsoft.com/office/powerpoint/2010/main" val="3866147858"/>
-      </p:ext>
-    </p:extLst>
-  </p:cSld>
-  <p:clrMapOvr>
-    <a:masterClrMapping/>
-  </p:clrMapOvr>
-</p:sld>
-</file>
-
-<file path=ppt/slides/slide14.xml><?xml version="1.0" encoding="utf-8"?>
-<p:sld xmlns:a="http://schemas.openxmlformats.org/drawingml/2006/main" xmlns:r="http://schemas.openxmlformats.org/officeDocument/2006/relationships" xmlns:p="http://schemas.openxmlformats.org/presentationml/2006/main">
-  <p:cSld>
-    <p:bg>
-      <p:bgPr>
-        <a:solidFill>
-          <a:srgbClr val="EBF1F5"/>
-        </a:solidFill>
-        <a:effectLst/>
-      </p:bgPr>
-    </p:bg>
-    <p:spTree>
-      <p:nvGrpSpPr>
-        <p:cNvPr id="1" name=""/>
-        <p:cNvGrpSpPr/>
-        <p:nvPr/>
-      </p:nvGrpSpPr>
-      <p:grpSpPr>
-        <a:xfrm>
-          <a:off x="0" y="0"/>
-          <a:ext cx="0" cy="0"/>
-          <a:chOff x="0" y="0"/>
-          <a:chExt cx="0" cy="0"/>
-        </a:xfrm>
-      </p:grpSpPr>
-      <p:sp>
-        <p:nvSpPr>
-          <p:cNvPr id="2" name="Título 1">
+      <p:pic>
+        <p:nvPicPr>
+          <p:cNvPr id="7" name="Imagen 6">
             <a:extLst>
               <a:ext uri="{FF2B5EF4-FFF2-40B4-BE49-F238E27FC236}">
-                <a16:creationId xmlns:a16="http://schemas.microsoft.com/office/drawing/2014/main" id="{67625ECE-3F3D-4827-8CD9-4C1D83085BDC}"/>
+                <a16:creationId xmlns:a16="http://schemas.microsoft.com/office/drawing/2014/main" id="{8B8EFD9A-2B18-4C09-924E-29490B109579}"/>
               </a:ext>
             </a:extLst>
           </p:cNvPr>
-          <p:cNvSpPr>
-            <a:spLocks noGrp="1"/>
-          </p:cNvSpPr>
-          <p:nvPr>
-            <p:ph type="title"/>
-          </p:nvPr>
-        </p:nvSpPr>
-        <p:spPr/>
-        <p:txBody>
-          <a:bodyPr/>
-          <a:lstStyle/>
-          <a:p>
-            <a:r>
-              <a:rPr lang="es-ES" b="1" dirty="0">
-                <a:latin typeface="Century Gothic" panose="020B0502020202020204" pitchFamily="34" charset="0"/>
-              </a:rPr>
-              <a:t>Ayudas económicas para estudiar las tecnologías</a:t>
-            </a:r>
-          </a:p>
-        </p:txBody>
-      </p:sp>
-      <p:sp>
-        <p:nvSpPr>
-          <p:cNvPr id="9" name="Marcador de contenido 2">
-            <a:extLst>
-              <a:ext uri="{FF2B5EF4-FFF2-40B4-BE49-F238E27FC236}">
-                <a16:creationId xmlns:a16="http://schemas.microsoft.com/office/drawing/2014/main" id="{D1EFBA3E-5E6D-45BB-86A8-AE203160817B}"/>
-              </a:ext>
-            </a:extLst>
-          </p:cNvPr>
-          <p:cNvSpPr txBox="1">
-            <a:spLocks/>
-          </p:cNvSpPr>
+          <p:cNvPicPr>
+            <a:picLocks noChangeAspect="1"/>
+          </p:cNvPicPr>
           <p:nvPr/>
-        </p:nvSpPr>
+        </p:nvPicPr>
+        <p:blipFill rotWithShape="1">
+          <a:blip r:embed="rId3"/>
+          <a:srcRect r="6278"/>
+          <a:stretch/>
+        </p:blipFill>
         <p:spPr>
           <a:xfrm>
-            <a:off x="1371600" y="2726635"/>
-            <a:ext cx="9601200" cy="2160103"/>
+            <a:off x="6834143" y="2876986"/>
+            <a:ext cx="5226412" cy="3295214"/>
           </a:xfrm>
           <a:prstGeom prst="rect">
             <a:avLst/>
           </a:prstGeom>
         </p:spPr>
-        <p:txBody>
-          <a:bodyPr vert="horz" lIns="91440" tIns="45720" rIns="91440" bIns="45720" rtlCol="0">
-            <a:normAutofit/>
-          </a:bodyPr>
-          <a:lstStyle>
-            <a:lvl1pPr marL="384048" indent="-384048" algn="l" defTabSz="914400" rtl="0" eaLnBrk="1" latinLnBrk="0" hangingPunct="1">
-              <a:lnSpc>
-                <a:spcPct val="94000"/>
-              </a:lnSpc>
-              <a:spcBef>
-                <a:spcPts val="1000"/>
-              </a:spcBef>
-              <a:spcAft>
-                <a:spcPts val="200"/>
-              </a:spcAft>
-              <a:buFont typeface="Franklin Gothic Book" panose="020B0503020102020204" pitchFamily="34" charset="0"/>
-              <a:buChar char="■"/>
-              <a:defRPr sz="2000" kern="1200" baseline="0">
-                <a:solidFill>
-                  <a:schemeClr val="tx2"/>
-                </a:solidFill>
-                <a:latin typeface="+mn-lt"/>
-                <a:ea typeface="+mn-ea"/>
-                <a:cs typeface="+mn-cs"/>
-              </a:defRPr>
-            </a:lvl1pPr>
-            <a:lvl2pPr marL="914400" indent="-384048" algn="l" defTabSz="914400" rtl="0" eaLnBrk="1" latinLnBrk="0" hangingPunct="1">
-              <a:lnSpc>
-                <a:spcPct val="94000"/>
-              </a:lnSpc>
-              <a:spcBef>
-                <a:spcPts val="500"/>
-              </a:spcBef>
-              <a:spcAft>
-                <a:spcPts val="200"/>
-              </a:spcAft>
-              <a:buFont typeface="Franklin Gothic Book" panose="020B0503020102020204" pitchFamily="34" charset="0"/>
-              <a:buChar char="–"/>
-              <a:defRPr sz="2000" i="1" kern="1200" baseline="0">
-                <a:solidFill>
-                  <a:schemeClr val="tx2"/>
-                </a:solidFill>
-                <a:latin typeface="+mn-lt"/>
-                <a:ea typeface="+mn-ea"/>
-                <a:cs typeface="+mn-cs"/>
-              </a:defRPr>
-            </a:lvl2pPr>
-            <a:lvl3pPr marL="1371600" indent="-384048" algn="l" defTabSz="914400" rtl="0" eaLnBrk="1" latinLnBrk="0" hangingPunct="1">
-              <a:lnSpc>
-                <a:spcPct val="94000"/>
-              </a:lnSpc>
-              <a:spcBef>
-                <a:spcPts val="500"/>
-              </a:spcBef>
-              <a:spcAft>
-                <a:spcPts val="200"/>
-              </a:spcAft>
-              <a:buFont typeface="Franklin Gothic Book" panose="020B0503020102020204" pitchFamily="34" charset="0"/>
-              <a:buChar char="■"/>
-              <a:defRPr sz="1800" kern="1200" baseline="0">
-                <a:solidFill>
-                  <a:schemeClr val="tx2"/>
-                </a:solidFill>
-                <a:latin typeface="+mn-lt"/>
-                <a:ea typeface="+mn-ea"/>
-                <a:cs typeface="+mn-cs"/>
-              </a:defRPr>
-            </a:lvl3pPr>
-            <a:lvl4pPr marL="1828800" indent="-384048" algn="l" defTabSz="914400" rtl="0" eaLnBrk="1" latinLnBrk="0" hangingPunct="1">
-              <a:lnSpc>
-                <a:spcPct val="94000"/>
-              </a:lnSpc>
-              <a:spcBef>
-                <a:spcPts val="500"/>
-              </a:spcBef>
-              <a:spcAft>
-                <a:spcPts val="200"/>
-              </a:spcAft>
-              <a:buFont typeface="Franklin Gothic Book" panose="020B0503020102020204" pitchFamily="34" charset="0"/>
-              <a:buChar char="–"/>
-              <a:defRPr sz="1800" i="1" kern="1200" baseline="0">
-                <a:solidFill>
-                  <a:schemeClr val="tx2"/>
-                </a:solidFill>
-                <a:latin typeface="+mn-lt"/>
-                <a:ea typeface="+mn-ea"/>
-                <a:cs typeface="+mn-cs"/>
-              </a:defRPr>
-            </a:lvl4pPr>
-            <a:lvl5pPr marL="2286000" indent="-384048" algn="l" defTabSz="914400" rtl="0" eaLnBrk="1" latinLnBrk="0" hangingPunct="1">
-              <a:lnSpc>
-                <a:spcPct val="94000"/>
-              </a:lnSpc>
-              <a:spcBef>
-                <a:spcPts val="500"/>
-              </a:spcBef>
-              <a:spcAft>
-                <a:spcPts val="200"/>
-              </a:spcAft>
-              <a:buFont typeface="Franklin Gothic Book" panose="020B0503020102020204" pitchFamily="34" charset="0"/>
-              <a:buChar char="■"/>
-              <a:defRPr sz="1600" kern="1200" baseline="0">
-                <a:solidFill>
-                  <a:schemeClr val="tx2"/>
-                </a:solidFill>
-                <a:latin typeface="+mn-lt"/>
-                <a:ea typeface="+mn-ea"/>
-                <a:cs typeface="+mn-cs"/>
-              </a:defRPr>
-            </a:lvl5pPr>
-            <a:lvl6pPr marL="2743200" indent="-384048" algn="l" defTabSz="914400" rtl="0" eaLnBrk="1" latinLnBrk="0" hangingPunct="1">
-              <a:lnSpc>
-                <a:spcPct val="94000"/>
-              </a:lnSpc>
-              <a:spcBef>
-                <a:spcPts val="500"/>
-              </a:spcBef>
-              <a:spcAft>
-                <a:spcPts val="200"/>
-              </a:spcAft>
-              <a:buFont typeface="Franklin Gothic Book" panose="020B0503020102020204" pitchFamily="34" charset="0"/>
-              <a:buChar char="–"/>
-              <a:defRPr sz="1600" i="1" kern="1200" baseline="0">
-                <a:solidFill>
-                  <a:schemeClr val="tx2"/>
-                </a:solidFill>
-                <a:latin typeface="+mn-lt"/>
-                <a:ea typeface="+mn-ea"/>
-                <a:cs typeface="+mn-cs"/>
-              </a:defRPr>
-            </a:lvl6pPr>
-            <a:lvl7pPr marL="3200400" indent="-384048" algn="l" defTabSz="914400" rtl="0" eaLnBrk="1" latinLnBrk="0" hangingPunct="1">
-              <a:lnSpc>
-                <a:spcPct val="94000"/>
-              </a:lnSpc>
-              <a:spcBef>
-                <a:spcPts val="500"/>
-              </a:spcBef>
-              <a:spcAft>
-                <a:spcPts val="200"/>
-              </a:spcAft>
-              <a:buFont typeface="Franklin Gothic Book" panose="020B0503020102020204" pitchFamily="34" charset="0"/>
-              <a:buChar char="■"/>
-              <a:defRPr sz="1400" kern="1200" baseline="0">
-                <a:solidFill>
-                  <a:schemeClr val="tx2"/>
-                </a:solidFill>
-                <a:latin typeface="+mn-lt"/>
-                <a:ea typeface="+mn-ea"/>
-                <a:cs typeface="+mn-cs"/>
-              </a:defRPr>
-            </a:lvl7pPr>
-            <a:lvl8pPr marL="3657600" indent="-384048" algn="l" defTabSz="914400" rtl="0" eaLnBrk="1" latinLnBrk="0" hangingPunct="1">
-              <a:lnSpc>
-                <a:spcPct val="94000"/>
-              </a:lnSpc>
-              <a:spcBef>
-                <a:spcPts val="500"/>
-              </a:spcBef>
-              <a:spcAft>
-                <a:spcPts val="200"/>
-              </a:spcAft>
-              <a:buFont typeface="Franklin Gothic Book" panose="020B0503020102020204" pitchFamily="34" charset="0"/>
-              <a:buChar char="–"/>
-              <a:defRPr sz="1400" i="1" kern="1200" baseline="0">
-                <a:solidFill>
-                  <a:schemeClr val="tx2"/>
-                </a:solidFill>
-                <a:latin typeface="+mn-lt"/>
-                <a:ea typeface="+mn-ea"/>
-                <a:cs typeface="+mn-cs"/>
-              </a:defRPr>
-            </a:lvl8pPr>
-            <a:lvl9pPr marL="4114800" indent="-384048" algn="l" defTabSz="914400" rtl="0" eaLnBrk="1" latinLnBrk="0" hangingPunct="1">
-              <a:lnSpc>
-                <a:spcPct val="94000"/>
-              </a:lnSpc>
-              <a:spcBef>
-                <a:spcPts val="500"/>
-              </a:spcBef>
-              <a:spcAft>
-                <a:spcPts val="200"/>
-              </a:spcAft>
-              <a:buFont typeface="Franklin Gothic Book" panose="020B0503020102020204" pitchFamily="34" charset="0"/>
-              <a:buChar char="■"/>
-              <a:defRPr sz="1400" kern="1200" baseline="0">
-                <a:solidFill>
-                  <a:schemeClr val="tx2"/>
-                </a:solidFill>
-                <a:latin typeface="+mn-lt"/>
-                <a:ea typeface="+mn-ea"/>
-                <a:cs typeface="+mn-cs"/>
-              </a:defRPr>
-            </a:lvl9pPr>
-          </a:lstStyle>
-          <a:p>
-            <a:pPr marL="0" indent="0">
-              <a:buNone/>
-            </a:pPr>
-            <a:r>
-              <a:rPr lang="es-ES" sz="2400" b="1" dirty="0" err="1">
-                <a:solidFill>
-                  <a:schemeClr val="tx1"/>
-                </a:solidFill>
-                <a:latin typeface="Century Gothic" panose="020B0502020202020204" pitchFamily="34" charset="0"/>
-              </a:rPr>
-              <a:t>Klj</a:t>
-            </a:r>
-            <a:endParaRPr lang="es-ES" sz="2400" b="1" dirty="0">
-              <a:solidFill>
-                <a:schemeClr val="tx1"/>
-              </a:solidFill>
-              <a:latin typeface="Century Gothic" panose="020B0502020202020204" pitchFamily="34" charset="0"/>
-            </a:endParaRPr>
-          </a:p>
-          <a:p>
-            <a:pPr marL="0" indent="0">
-              <a:buNone/>
-            </a:pPr>
-            <a:endParaRPr lang="es-ES" sz="2400" b="1" dirty="0">
-              <a:solidFill>
-                <a:schemeClr val="tx1"/>
-              </a:solidFill>
-              <a:latin typeface="Century Gothic" panose="020B0502020202020204" pitchFamily="34" charset="0"/>
-            </a:endParaRPr>
-          </a:p>
-        </p:txBody>
-      </p:sp>
+      </p:pic>
+      <p:pic>
+        <p:nvPicPr>
+          <p:cNvPr id="8" name="Imagen 7">
+            <a:extLst>
+              <a:ext uri="{FF2B5EF4-FFF2-40B4-BE49-F238E27FC236}">
+                <a16:creationId xmlns:a16="http://schemas.microsoft.com/office/drawing/2014/main" id="{38027704-4B7C-490A-A937-547DB2DF5DD5}"/>
+              </a:ext>
+            </a:extLst>
+          </p:cNvPr>
+          <p:cNvPicPr>
+            <a:picLocks noChangeAspect="1"/>
+          </p:cNvPicPr>
+          <p:nvPr/>
+        </p:nvPicPr>
+        <p:blipFill rotWithShape="1">
+          <a:blip r:embed="rId4"/>
+          <a:srcRect l="1868" r="3715"/>
+          <a:stretch/>
+        </p:blipFill>
+        <p:spPr>
+          <a:xfrm>
+            <a:off x="853440" y="2876986"/>
+            <a:ext cx="5732060" cy="3295214"/>
+          </a:xfrm>
+          <a:prstGeom prst="rect">
+            <a:avLst/>
+          </a:prstGeom>
+        </p:spPr>
+      </p:pic>
     </p:spTree>
     <p:extLst>
       <p:ext uri="{BB962C8B-B14F-4D97-AF65-F5344CB8AC3E}">
-        <p14:creationId xmlns:p14="http://schemas.microsoft.com/office/powerpoint/2010/main" val="3865882864"/>
+        <p14:creationId xmlns:p14="http://schemas.microsoft.com/office/powerpoint/2010/main" val="3866147858"/>
       </p:ext>
     </p:extLst>
   </p:cSld>
@@ -6328,6 +7037,325 @@
             <p:ph type="title"/>
           </p:nvPr>
         </p:nvSpPr>
+        <p:spPr/>
+        <p:txBody>
+          <a:bodyPr/>
+          <a:lstStyle/>
+          <a:p>
+            <a:r>
+              <a:rPr lang="es-ES" b="1" dirty="0">
+                <a:latin typeface="Century Gothic" panose="020B0502020202020204" pitchFamily="34" charset="0"/>
+              </a:rPr>
+              <a:t>Ayudas económicas para estudiar las tecnologías</a:t>
+            </a:r>
+          </a:p>
+        </p:txBody>
+      </p:sp>
+      <p:sp>
+        <p:nvSpPr>
+          <p:cNvPr id="9" name="Marcador de contenido 2">
+            <a:extLst>
+              <a:ext uri="{FF2B5EF4-FFF2-40B4-BE49-F238E27FC236}">
+                <a16:creationId xmlns:a16="http://schemas.microsoft.com/office/drawing/2014/main" id="{D1EFBA3E-5E6D-45BB-86A8-AE203160817B}"/>
+              </a:ext>
+            </a:extLst>
+          </p:cNvPr>
+          <p:cNvSpPr txBox="1">
+            <a:spLocks/>
+          </p:cNvSpPr>
+          <p:nvPr/>
+        </p:nvSpPr>
+        <p:spPr>
+          <a:xfrm>
+            <a:off x="1371600" y="2726635"/>
+            <a:ext cx="9601200" cy="2160103"/>
+          </a:xfrm>
+          <a:prstGeom prst="rect">
+            <a:avLst/>
+          </a:prstGeom>
+        </p:spPr>
+        <p:txBody>
+          <a:bodyPr vert="horz" lIns="91440" tIns="45720" rIns="91440" bIns="45720" rtlCol="0">
+            <a:normAutofit/>
+          </a:bodyPr>
+          <a:lstStyle>
+            <a:lvl1pPr marL="384048" indent="-384048" algn="l" defTabSz="914400" rtl="0" eaLnBrk="1" latinLnBrk="0" hangingPunct="1">
+              <a:lnSpc>
+                <a:spcPct val="94000"/>
+              </a:lnSpc>
+              <a:spcBef>
+                <a:spcPts val="1000"/>
+              </a:spcBef>
+              <a:spcAft>
+                <a:spcPts val="200"/>
+              </a:spcAft>
+              <a:buFont typeface="Franklin Gothic Book" panose="020B0503020102020204" pitchFamily="34" charset="0"/>
+              <a:buChar char="■"/>
+              <a:defRPr sz="2000" kern="1200" baseline="0">
+                <a:solidFill>
+                  <a:schemeClr val="tx2"/>
+                </a:solidFill>
+                <a:latin typeface="+mn-lt"/>
+                <a:ea typeface="+mn-ea"/>
+                <a:cs typeface="+mn-cs"/>
+              </a:defRPr>
+            </a:lvl1pPr>
+            <a:lvl2pPr marL="914400" indent="-384048" algn="l" defTabSz="914400" rtl="0" eaLnBrk="1" latinLnBrk="0" hangingPunct="1">
+              <a:lnSpc>
+                <a:spcPct val="94000"/>
+              </a:lnSpc>
+              <a:spcBef>
+                <a:spcPts val="500"/>
+              </a:spcBef>
+              <a:spcAft>
+                <a:spcPts val="200"/>
+              </a:spcAft>
+              <a:buFont typeface="Franklin Gothic Book" panose="020B0503020102020204" pitchFamily="34" charset="0"/>
+              <a:buChar char="–"/>
+              <a:defRPr sz="2000" i="1" kern="1200" baseline="0">
+                <a:solidFill>
+                  <a:schemeClr val="tx2"/>
+                </a:solidFill>
+                <a:latin typeface="+mn-lt"/>
+                <a:ea typeface="+mn-ea"/>
+                <a:cs typeface="+mn-cs"/>
+              </a:defRPr>
+            </a:lvl2pPr>
+            <a:lvl3pPr marL="1371600" indent="-384048" algn="l" defTabSz="914400" rtl="0" eaLnBrk="1" latinLnBrk="0" hangingPunct="1">
+              <a:lnSpc>
+                <a:spcPct val="94000"/>
+              </a:lnSpc>
+              <a:spcBef>
+                <a:spcPts val="500"/>
+              </a:spcBef>
+              <a:spcAft>
+                <a:spcPts val="200"/>
+              </a:spcAft>
+              <a:buFont typeface="Franklin Gothic Book" panose="020B0503020102020204" pitchFamily="34" charset="0"/>
+              <a:buChar char="■"/>
+              <a:defRPr sz="1800" kern="1200" baseline="0">
+                <a:solidFill>
+                  <a:schemeClr val="tx2"/>
+                </a:solidFill>
+                <a:latin typeface="+mn-lt"/>
+                <a:ea typeface="+mn-ea"/>
+                <a:cs typeface="+mn-cs"/>
+              </a:defRPr>
+            </a:lvl3pPr>
+            <a:lvl4pPr marL="1828800" indent="-384048" algn="l" defTabSz="914400" rtl="0" eaLnBrk="1" latinLnBrk="0" hangingPunct="1">
+              <a:lnSpc>
+                <a:spcPct val="94000"/>
+              </a:lnSpc>
+              <a:spcBef>
+                <a:spcPts val="500"/>
+              </a:spcBef>
+              <a:spcAft>
+                <a:spcPts val="200"/>
+              </a:spcAft>
+              <a:buFont typeface="Franklin Gothic Book" panose="020B0503020102020204" pitchFamily="34" charset="0"/>
+              <a:buChar char="–"/>
+              <a:defRPr sz="1800" i="1" kern="1200" baseline="0">
+                <a:solidFill>
+                  <a:schemeClr val="tx2"/>
+                </a:solidFill>
+                <a:latin typeface="+mn-lt"/>
+                <a:ea typeface="+mn-ea"/>
+                <a:cs typeface="+mn-cs"/>
+              </a:defRPr>
+            </a:lvl4pPr>
+            <a:lvl5pPr marL="2286000" indent="-384048" algn="l" defTabSz="914400" rtl="0" eaLnBrk="1" latinLnBrk="0" hangingPunct="1">
+              <a:lnSpc>
+                <a:spcPct val="94000"/>
+              </a:lnSpc>
+              <a:spcBef>
+                <a:spcPts val="500"/>
+              </a:spcBef>
+              <a:spcAft>
+                <a:spcPts val="200"/>
+              </a:spcAft>
+              <a:buFont typeface="Franklin Gothic Book" panose="020B0503020102020204" pitchFamily="34" charset="0"/>
+              <a:buChar char="■"/>
+              <a:defRPr sz="1600" kern="1200" baseline="0">
+                <a:solidFill>
+                  <a:schemeClr val="tx2"/>
+                </a:solidFill>
+                <a:latin typeface="+mn-lt"/>
+                <a:ea typeface="+mn-ea"/>
+                <a:cs typeface="+mn-cs"/>
+              </a:defRPr>
+            </a:lvl5pPr>
+            <a:lvl6pPr marL="2743200" indent="-384048" algn="l" defTabSz="914400" rtl="0" eaLnBrk="1" latinLnBrk="0" hangingPunct="1">
+              <a:lnSpc>
+                <a:spcPct val="94000"/>
+              </a:lnSpc>
+              <a:spcBef>
+                <a:spcPts val="500"/>
+              </a:spcBef>
+              <a:spcAft>
+                <a:spcPts val="200"/>
+              </a:spcAft>
+              <a:buFont typeface="Franklin Gothic Book" panose="020B0503020102020204" pitchFamily="34" charset="0"/>
+              <a:buChar char="–"/>
+              <a:defRPr sz="1600" i="1" kern="1200" baseline="0">
+                <a:solidFill>
+                  <a:schemeClr val="tx2"/>
+                </a:solidFill>
+                <a:latin typeface="+mn-lt"/>
+                <a:ea typeface="+mn-ea"/>
+                <a:cs typeface="+mn-cs"/>
+              </a:defRPr>
+            </a:lvl6pPr>
+            <a:lvl7pPr marL="3200400" indent="-384048" algn="l" defTabSz="914400" rtl="0" eaLnBrk="1" latinLnBrk="0" hangingPunct="1">
+              <a:lnSpc>
+                <a:spcPct val="94000"/>
+              </a:lnSpc>
+              <a:spcBef>
+                <a:spcPts val="500"/>
+              </a:spcBef>
+              <a:spcAft>
+                <a:spcPts val="200"/>
+              </a:spcAft>
+              <a:buFont typeface="Franklin Gothic Book" panose="020B0503020102020204" pitchFamily="34" charset="0"/>
+              <a:buChar char="■"/>
+              <a:defRPr sz="1400" kern="1200" baseline="0">
+                <a:solidFill>
+                  <a:schemeClr val="tx2"/>
+                </a:solidFill>
+                <a:latin typeface="+mn-lt"/>
+                <a:ea typeface="+mn-ea"/>
+                <a:cs typeface="+mn-cs"/>
+              </a:defRPr>
+            </a:lvl7pPr>
+            <a:lvl8pPr marL="3657600" indent="-384048" algn="l" defTabSz="914400" rtl="0" eaLnBrk="1" latinLnBrk="0" hangingPunct="1">
+              <a:lnSpc>
+                <a:spcPct val="94000"/>
+              </a:lnSpc>
+              <a:spcBef>
+                <a:spcPts val="500"/>
+              </a:spcBef>
+              <a:spcAft>
+                <a:spcPts val="200"/>
+              </a:spcAft>
+              <a:buFont typeface="Franklin Gothic Book" panose="020B0503020102020204" pitchFamily="34" charset="0"/>
+              <a:buChar char="–"/>
+              <a:defRPr sz="1400" i="1" kern="1200" baseline="0">
+                <a:solidFill>
+                  <a:schemeClr val="tx2"/>
+                </a:solidFill>
+                <a:latin typeface="+mn-lt"/>
+                <a:ea typeface="+mn-ea"/>
+                <a:cs typeface="+mn-cs"/>
+              </a:defRPr>
+            </a:lvl8pPr>
+            <a:lvl9pPr marL="4114800" indent="-384048" algn="l" defTabSz="914400" rtl="0" eaLnBrk="1" latinLnBrk="0" hangingPunct="1">
+              <a:lnSpc>
+                <a:spcPct val="94000"/>
+              </a:lnSpc>
+              <a:spcBef>
+                <a:spcPts val="500"/>
+              </a:spcBef>
+              <a:spcAft>
+                <a:spcPts val="200"/>
+              </a:spcAft>
+              <a:buFont typeface="Franklin Gothic Book" panose="020B0503020102020204" pitchFamily="34" charset="0"/>
+              <a:buChar char="■"/>
+              <a:defRPr sz="1400" kern="1200" baseline="0">
+                <a:solidFill>
+                  <a:schemeClr val="tx2"/>
+                </a:solidFill>
+                <a:latin typeface="+mn-lt"/>
+                <a:ea typeface="+mn-ea"/>
+                <a:cs typeface="+mn-cs"/>
+              </a:defRPr>
+            </a:lvl9pPr>
+          </a:lstStyle>
+          <a:p>
+            <a:pPr marL="0" indent="0">
+              <a:buNone/>
+            </a:pPr>
+            <a:r>
+              <a:rPr lang="es-ES" sz="2400" b="1" dirty="0" err="1">
+                <a:solidFill>
+                  <a:schemeClr val="tx1"/>
+                </a:solidFill>
+                <a:latin typeface="Century Gothic" panose="020B0502020202020204" pitchFamily="34" charset="0"/>
+              </a:rPr>
+              <a:t>Klj</a:t>
+            </a:r>
+            <a:endParaRPr lang="es-ES" sz="2400" b="1" dirty="0">
+              <a:solidFill>
+                <a:schemeClr val="tx1"/>
+              </a:solidFill>
+              <a:latin typeface="Century Gothic" panose="020B0502020202020204" pitchFamily="34" charset="0"/>
+            </a:endParaRPr>
+          </a:p>
+          <a:p>
+            <a:pPr marL="0" indent="0">
+              <a:buNone/>
+            </a:pPr>
+            <a:endParaRPr lang="es-ES" sz="2400" b="1" dirty="0">
+              <a:solidFill>
+                <a:schemeClr val="tx1"/>
+              </a:solidFill>
+              <a:latin typeface="Century Gothic" panose="020B0502020202020204" pitchFamily="34" charset="0"/>
+            </a:endParaRPr>
+          </a:p>
+        </p:txBody>
+      </p:sp>
+    </p:spTree>
+    <p:extLst>
+      <p:ext uri="{BB962C8B-B14F-4D97-AF65-F5344CB8AC3E}">
+        <p14:creationId xmlns:p14="http://schemas.microsoft.com/office/powerpoint/2010/main" val="3865882864"/>
+      </p:ext>
+    </p:extLst>
+  </p:cSld>
+  <p:clrMapOvr>
+    <a:masterClrMapping/>
+  </p:clrMapOvr>
+</p:sld>
+</file>
+
+<file path=ppt/slides/slide16.xml><?xml version="1.0" encoding="utf-8"?>
+<p:sld xmlns:a="http://schemas.openxmlformats.org/drawingml/2006/main" xmlns:r="http://schemas.openxmlformats.org/officeDocument/2006/relationships" xmlns:p="http://schemas.openxmlformats.org/presentationml/2006/main">
+  <p:cSld>
+    <p:bg>
+      <p:bgPr>
+        <a:solidFill>
+          <a:srgbClr val="EBF1F5"/>
+        </a:solidFill>
+        <a:effectLst/>
+      </p:bgPr>
+    </p:bg>
+    <p:spTree>
+      <p:nvGrpSpPr>
+        <p:cNvPr id="1" name=""/>
+        <p:cNvGrpSpPr/>
+        <p:nvPr/>
+      </p:nvGrpSpPr>
+      <p:grpSpPr>
+        <a:xfrm>
+          <a:off x="0" y="0"/>
+          <a:ext cx="0" cy="0"/>
+          <a:chOff x="0" y="0"/>
+          <a:chExt cx="0" cy="0"/>
+        </a:xfrm>
+      </p:grpSpPr>
+      <p:sp>
+        <p:nvSpPr>
+          <p:cNvPr id="2" name="Título 1">
+            <a:extLst>
+              <a:ext uri="{FF2B5EF4-FFF2-40B4-BE49-F238E27FC236}">
+                <a16:creationId xmlns:a16="http://schemas.microsoft.com/office/drawing/2014/main" id="{67625ECE-3F3D-4827-8CD9-4C1D83085BDC}"/>
+              </a:ext>
+            </a:extLst>
+          </p:cNvPr>
+          <p:cNvSpPr>
+            <a:spLocks noGrp="1"/>
+          </p:cNvSpPr>
+          <p:nvPr>
+            <p:ph type="title"/>
+          </p:nvPr>
+        </p:nvSpPr>
         <p:spPr>
           <a:xfrm>
             <a:off x="1371600" y="685800"/>
@@ -6387,7 +7415,7 @@
         </p:nvSpPr>
         <p:spPr>
           <a:xfrm>
-            <a:off x="2590800" y="2829339"/>
+            <a:off x="1921564" y="2171700"/>
             <a:ext cx="9601200" cy="483704"/>
           </a:xfrm>
         </p:spPr>
@@ -6397,14 +7425,14 @@
           </a:bodyPr>
           <a:lstStyle/>
           <a:p>
-            <a:pPr marL="0" indent="0">
+            <a:pPr marL="0" indent="0" algn="ctr">
               <a:buNone/>
             </a:pPr>
             <a:r>
               <a:rPr lang="es-ES" sz="2400" b="1" dirty="0">
                 <a:latin typeface="Century Gothic" panose="020B0502020202020204" pitchFamily="34" charset="0"/>
               </a:rPr>
-              <a:t>Herramientas utilizadas:</a:t>
+              <a:t>Herramientas utilizadas: Google</a:t>
             </a:r>
           </a:p>
         </p:txBody>
@@ -6425,8 +7453,8 @@
         </p:nvSpPr>
         <p:spPr>
           <a:xfrm>
-            <a:off x="1539240" y="3429000"/>
-            <a:ext cx="9601200" cy="2160103"/>
+            <a:off x="1829150" y="3237891"/>
+            <a:ext cx="2336724" cy="2160103"/>
           </a:xfrm>
           <a:prstGeom prst="rect">
             <a:avLst/>
@@ -6639,28 +7667,12 @@
                 </a:solidFill>
                 <a:latin typeface="Century Gothic" panose="020B0502020202020204" pitchFamily="34" charset="0"/>
               </a:rPr>
-              <a:t> </a:t>
-            </a:r>
-          </a:p>
-          <a:p>
-            <a:pPr marL="457200" indent="-457200">
-              <a:buFont typeface="+mj-lt"/>
-              <a:buAutoNum type="arabicPeriod"/>
-            </a:pPr>
-            <a:r>
-              <a:rPr lang="es-ES" sz="2400" b="1" dirty="0">
-                <a:solidFill>
-                  <a:schemeClr val="tx1"/>
-                </a:solidFill>
-                <a:latin typeface="Century Gothic" panose="020B0502020202020204" pitchFamily="34" charset="0"/>
-              </a:rPr>
-              <a:t> </a:t>
-            </a:r>
-          </a:p>
-          <a:p>
-            <a:pPr marL="457200" indent="-457200">
-              <a:buFont typeface="+mj-lt"/>
-              <a:buAutoNum type="arabicPeriod"/>
+              <a:t>GRATUITOS </a:t>
+            </a:r>
+          </a:p>
+          <a:p>
+            <a:pPr marL="0" indent="0">
+              <a:buNone/>
             </a:pPr>
             <a:r>
               <a:rPr lang="es-ES" sz="2400" b="1" dirty="0">
@@ -6721,6 +7733,158 @@
           </a:extLst>
         </p:spPr>
       </p:pic>
+      <p:sp>
+        <p:nvSpPr>
+          <p:cNvPr id="4" name="CuadroTexto 3">
+            <a:extLst>
+              <a:ext uri="{FF2B5EF4-FFF2-40B4-BE49-F238E27FC236}">
+                <a16:creationId xmlns:a16="http://schemas.microsoft.com/office/drawing/2014/main" id="{B9238F01-0596-415D-A4A4-61469D1E88CA}"/>
+              </a:ext>
+            </a:extLst>
+          </p:cNvPr>
+          <p:cNvSpPr txBox="1"/>
+          <p:nvPr/>
+        </p:nvSpPr>
+        <p:spPr>
+          <a:xfrm>
+            <a:off x="8967461" y="3026384"/>
+            <a:ext cx="3698544" cy="738664"/>
+          </a:xfrm>
+          <a:prstGeom prst="rect">
+            <a:avLst/>
+          </a:prstGeom>
+          <a:noFill/>
+        </p:spPr>
+        <p:txBody>
+          <a:bodyPr wrap="square" rtlCol="0">
+            <a:spAutoFit/>
+          </a:bodyPr>
+          <a:lstStyle/>
+          <a:p>
+            <a:r>
+              <a:rPr lang="es-ES" sz="2400" b="1" dirty="0">
+                <a:latin typeface="Century Gothic" panose="020B0502020202020204" pitchFamily="34" charset="0"/>
+              </a:rPr>
+              <a:t> 2. NO GRATUITOS</a:t>
+            </a:r>
+          </a:p>
+          <a:p>
+            <a:endParaRPr lang="es-ES_tradnl" dirty="0"/>
+          </a:p>
+        </p:txBody>
+      </p:sp>
+      <p:pic>
+        <p:nvPicPr>
+          <p:cNvPr id="7" name="Imagen 6" descr="Resultado de imagen de laravel composer descargar">
+            <a:extLst>
+              <a:ext uri="{FF2B5EF4-FFF2-40B4-BE49-F238E27FC236}">
+                <a16:creationId xmlns:a16="http://schemas.microsoft.com/office/drawing/2014/main" id="{D3006A5B-EC02-4D9B-8C40-B6BF926D6C9F}"/>
+              </a:ext>
+            </a:extLst>
+          </p:cNvPr>
+          <p:cNvPicPr/>
+          <p:nvPr/>
+        </p:nvPicPr>
+        <p:blipFill>
+          <a:blip r:embed="rId3">
+            <a:extLst>
+              <a:ext uri="{28A0092B-C50C-407E-A947-70E740481C1C}">
+                <a14:useLocalDpi xmlns:a14="http://schemas.microsoft.com/office/drawing/2010/main" val="0"/>
+              </a:ext>
+            </a:extLst>
+          </a:blip>
+          <a:srcRect/>
+          <a:stretch>
+            <a:fillRect/>
+          </a:stretch>
+        </p:blipFill>
+        <p:spPr bwMode="auto">
+          <a:xfrm>
+            <a:off x="4937971" y="3159875"/>
+            <a:ext cx="2764327" cy="2367050"/>
+          </a:xfrm>
+          <a:prstGeom prst="rect">
+            <a:avLst/>
+          </a:prstGeom>
+          <a:noFill/>
+          <a:ln>
+            <a:noFill/>
+          </a:ln>
+        </p:spPr>
+      </p:pic>
+      <p:pic>
+        <p:nvPicPr>
+          <p:cNvPr id="8" name="Imagen 7">
+            <a:extLst>
+              <a:ext uri="{FF2B5EF4-FFF2-40B4-BE49-F238E27FC236}">
+                <a16:creationId xmlns:a16="http://schemas.microsoft.com/office/drawing/2014/main" id="{AB0CC6EC-4796-4924-B4B7-6F7070068810}"/>
+              </a:ext>
+            </a:extLst>
+          </p:cNvPr>
+          <p:cNvPicPr/>
+          <p:nvPr/>
+        </p:nvPicPr>
+        <p:blipFill>
+          <a:blip r:embed="rId4">
+            <a:extLst>
+              <a:ext uri="{28A0092B-C50C-407E-A947-70E740481C1C}">
+                <a14:useLocalDpi xmlns:a14="http://schemas.microsoft.com/office/drawing/2010/main" val="0"/>
+              </a:ext>
+            </a:extLst>
+          </a:blip>
+          <a:stretch>
+            <a:fillRect/>
+          </a:stretch>
+        </p:blipFill>
+        <p:spPr>
+          <a:xfrm>
+            <a:off x="8816734" y="3768858"/>
+            <a:ext cx="3092232" cy="1601780"/>
+          </a:xfrm>
+          <a:prstGeom prst="rect">
+            <a:avLst/>
+          </a:prstGeom>
+        </p:spPr>
+      </p:pic>
+      <p:pic>
+        <p:nvPicPr>
+          <p:cNvPr id="12" name="Imagen 11" descr="Resultado de imagen de yii2 visual studio code">
+            <a:extLst>
+              <a:ext uri="{FF2B5EF4-FFF2-40B4-BE49-F238E27FC236}">
+                <a16:creationId xmlns:a16="http://schemas.microsoft.com/office/drawing/2014/main" id="{983588FE-B0ED-42D7-BB33-4CFCB8F5B7F6}"/>
+              </a:ext>
+            </a:extLst>
+          </p:cNvPr>
+          <p:cNvPicPr/>
+          <p:nvPr/>
+        </p:nvPicPr>
+        <p:blipFill>
+          <a:blip r:embed="rId5" cstate="print">
+            <a:extLst>
+              <a:ext uri="{28A0092B-C50C-407E-A947-70E740481C1C}">
+                <a14:useLocalDpi xmlns:a14="http://schemas.microsoft.com/office/drawing/2010/main" val="0"/>
+              </a:ext>
+            </a:extLst>
+          </a:blip>
+          <a:srcRect/>
+          <a:stretch>
+            <a:fillRect/>
+          </a:stretch>
+        </p:blipFill>
+        <p:spPr bwMode="auto">
+          <a:xfrm>
+            <a:off x="883577" y="3930555"/>
+            <a:ext cx="3824901" cy="2392775"/>
+          </a:xfrm>
+          <a:prstGeom prst="rect">
+            <a:avLst/>
+          </a:prstGeom>
+          <a:noFill/>
+          <a:ln>
+            <a:noFill/>
+          </a:ln>
+        </p:spPr>
+      </p:pic>
     </p:spTree>
     <p:extLst>
       <p:ext uri="{BB962C8B-B14F-4D97-AF65-F5344CB8AC3E}">
@@ -6734,7 +7898,7 @@
 </p:sld>
 </file>
 
-<file path=ppt/slides/slide16.xml><?xml version="1.0" encoding="utf-8"?>
+<file path=ppt/slides/slide17.xml><?xml version="1.0" encoding="utf-8"?>
 <p:sld xmlns:a="http://schemas.openxmlformats.org/drawingml/2006/main" xmlns:r="http://schemas.openxmlformats.org/officeDocument/2006/relationships" xmlns:p="http://schemas.openxmlformats.org/presentationml/2006/main">
   <p:cSld>
     <p:bg>
@@ -6823,7 +7987,7 @@
         </p:nvSpPr>
         <p:spPr>
           <a:xfrm>
-            <a:off x="1874520" y="2171700"/>
+            <a:off x="1851660" y="2558498"/>
             <a:ext cx="9601200" cy="483704"/>
           </a:xfrm>
         </p:spPr>
@@ -6840,7 +8004,7 @@
               <a:rPr lang="es-ES" sz="2400" b="1" dirty="0">
                 <a:latin typeface="Century Gothic" panose="020B0502020202020204" pitchFamily="34" charset="0"/>
               </a:rPr>
-              <a:t>Herramientas utilizadas:</a:t>
+              <a:t>Herramientas utilizadas: Google</a:t>
             </a:r>
           </a:p>
         </p:txBody>
@@ -6861,8 +8025,8 @@
         </p:nvSpPr>
         <p:spPr>
           <a:xfrm>
-            <a:off x="1539240" y="3429000"/>
-            <a:ext cx="9601200" cy="2160103"/>
+            <a:off x="1371600" y="3042202"/>
+            <a:ext cx="2486850" cy="2160103"/>
           </a:xfrm>
           <a:prstGeom prst="rect">
             <a:avLst/>
@@ -7075,38 +8239,19 @@
                 </a:solidFill>
                 <a:latin typeface="Century Gothic" panose="020B0502020202020204" pitchFamily="34" charset="0"/>
               </a:rPr>
-              <a:t> </a:t>
-            </a:r>
-          </a:p>
-          <a:p>
-            <a:pPr marL="457200" indent="-457200">
-              <a:buFont typeface="+mj-lt"/>
-              <a:buAutoNum type="arabicPeriod"/>
+              <a:t> GRATUITOS</a:t>
+            </a:r>
+          </a:p>
+          <a:p>
+            <a:pPr marL="0" indent="0">
+              <a:buNone/>
             </a:pPr>
-            <a:r>
-              <a:rPr lang="es-ES" sz="2400" b="1" dirty="0">
-                <a:solidFill>
-                  <a:schemeClr val="tx1"/>
-                </a:solidFill>
-                <a:latin typeface="Century Gothic" panose="020B0502020202020204" pitchFamily="34" charset="0"/>
-              </a:rPr>
-              <a:t> </a:t>
-            </a:r>
-          </a:p>
-          <a:p>
-            <a:pPr marL="457200" indent="-457200">
-              <a:buFont typeface="+mj-lt"/>
-              <a:buAutoNum type="arabicPeriod"/>
-            </a:pPr>
-            <a:r>
-              <a:rPr lang="es-ES" sz="2400" b="1" dirty="0">
-                <a:solidFill>
-                  <a:schemeClr val="tx1"/>
-                </a:solidFill>
-                <a:latin typeface="Century Gothic" panose="020B0502020202020204" pitchFamily="34" charset="0"/>
-              </a:rPr>
-              <a:t> </a:t>
-            </a:r>
+            <a:endParaRPr lang="es-ES" sz="2400" b="1" dirty="0">
+              <a:solidFill>
+                <a:schemeClr val="tx1"/>
+              </a:solidFill>
+              <a:latin typeface="Century Gothic" panose="020B0502020202020204" pitchFamily="34" charset="0"/>
+            </a:endParaRPr>
           </a:p>
         </p:txBody>
       </p:sp>
@@ -7157,6 +8302,237 @@
           </a:extLst>
         </p:spPr>
       </p:pic>
+      <p:sp>
+        <p:nvSpPr>
+          <p:cNvPr id="4" name="CuadroTexto 3">
+            <a:extLst>
+              <a:ext uri="{FF2B5EF4-FFF2-40B4-BE49-F238E27FC236}">
+                <a16:creationId xmlns:a16="http://schemas.microsoft.com/office/drawing/2014/main" id="{A94106E9-1902-475A-8E0B-E53E67AC8D94}"/>
+              </a:ext>
+            </a:extLst>
+          </p:cNvPr>
+          <p:cNvSpPr txBox="1"/>
+          <p:nvPr/>
+        </p:nvSpPr>
+        <p:spPr>
+          <a:xfrm>
+            <a:off x="8792456" y="2987040"/>
+            <a:ext cx="3095767" cy="738664"/>
+          </a:xfrm>
+          <a:prstGeom prst="rect">
+            <a:avLst/>
+          </a:prstGeom>
+          <a:noFill/>
+        </p:spPr>
+        <p:txBody>
+          <a:bodyPr wrap="square" rtlCol="0">
+            <a:spAutoFit/>
+          </a:bodyPr>
+          <a:lstStyle/>
+          <a:p>
+            <a:r>
+              <a:rPr lang="es-ES" sz="2400" b="1" dirty="0">
+                <a:latin typeface="Century Gothic" panose="020B0502020202020204" pitchFamily="34" charset="0"/>
+              </a:rPr>
+              <a:t>2. NO GRATUITOS</a:t>
+            </a:r>
+          </a:p>
+          <a:p>
+            <a:endParaRPr lang="es-ES_tradnl" dirty="0"/>
+          </a:p>
+        </p:txBody>
+      </p:sp>
+      <p:pic>
+        <p:nvPicPr>
+          <p:cNvPr id="7" name="Imagen 6" descr="https://nova.laravel.com/img/screenshot.png">
+            <a:extLst>
+              <a:ext uri="{FF2B5EF4-FFF2-40B4-BE49-F238E27FC236}">
+                <a16:creationId xmlns:a16="http://schemas.microsoft.com/office/drawing/2014/main" id="{94312CFF-D2AE-44BB-BC5B-4D3EBF3582D7}"/>
+              </a:ext>
+            </a:extLst>
+          </p:cNvPr>
+          <p:cNvPicPr/>
+          <p:nvPr/>
+        </p:nvPicPr>
+        <p:blipFill rotWithShape="1">
+          <a:blip r:embed="rId3" cstate="print">
+            <a:extLst>
+              <a:ext uri="{28A0092B-C50C-407E-A947-70E740481C1C}">
+                <a14:useLocalDpi xmlns:a14="http://schemas.microsoft.com/office/drawing/2010/main" val="0"/>
+              </a:ext>
+            </a:extLst>
+          </a:blip>
+          <a:srcRect r="44061" b="66168"/>
+          <a:stretch/>
+        </p:blipFill>
+        <p:spPr bwMode="auto">
+          <a:xfrm>
+            <a:off x="8629314" y="4995682"/>
+            <a:ext cx="3196023" cy="1345096"/>
+          </a:xfrm>
+          <a:prstGeom prst="rect">
+            <a:avLst/>
+          </a:prstGeom>
+          <a:noFill/>
+          <a:ln>
+            <a:noFill/>
+          </a:ln>
+          <a:extLst>
+            <a:ext uri="{53640926-AAD7-44D8-BBD7-CCE9431645EC}">
+              <a14:shadowObscured xmlns:a14="http://schemas.microsoft.com/office/drawing/2010/main"/>
+            </a:ext>
+          </a:extLst>
+        </p:spPr>
+      </p:pic>
+      <p:pic>
+        <p:nvPicPr>
+          <p:cNvPr id="8" name="Imagen 7" descr="https://res.cloudinary.com/dtfbvvkyp/image/upload/v1537195039/photos/Test.png">
+            <a:extLst>
+              <a:ext uri="{FF2B5EF4-FFF2-40B4-BE49-F238E27FC236}">
+                <a16:creationId xmlns:a16="http://schemas.microsoft.com/office/drawing/2014/main" id="{A14147A9-A566-4576-BD73-59A433C19A72}"/>
+              </a:ext>
+            </a:extLst>
+          </p:cNvPr>
+          <p:cNvPicPr/>
+          <p:nvPr/>
+        </p:nvPicPr>
+        <p:blipFill rotWithShape="1">
+          <a:blip r:embed="rId4" cstate="print">
+            <a:extLst>
+              <a:ext uri="{28A0092B-C50C-407E-A947-70E740481C1C}">
+                <a14:useLocalDpi xmlns:a14="http://schemas.microsoft.com/office/drawing/2010/main" val="0"/>
+              </a:ext>
+            </a:extLst>
+          </a:blip>
+          <a:srcRect r="44581" b="65708"/>
+          <a:stretch/>
+        </p:blipFill>
+        <p:spPr bwMode="auto">
+          <a:xfrm>
+            <a:off x="1021889" y="3388995"/>
+            <a:ext cx="1926028" cy="954405"/>
+          </a:xfrm>
+          <a:prstGeom prst="rect">
+            <a:avLst/>
+          </a:prstGeom>
+          <a:noFill/>
+          <a:ln>
+            <a:noFill/>
+          </a:ln>
+        </p:spPr>
+      </p:pic>
+      <p:pic>
+        <p:nvPicPr>
+          <p:cNvPr id="10" name="Imagen 9" descr="Resultado de imagen de visual studio code laravel">
+            <a:extLst>
+              <a:ext uri="{FF2B5EF4-FFF2-40B4-BE49-F238E27FC236}">
+                <a16:creationId xmlns:a16="http://schemas.microsoft.com/office/drawing/2014/main" id="{36F87A1B-BCAF-47AB-8965-8C40D3779FBB}"/>
+              </a:ext>
+            </a:extLst>
+          </p:cNvPr>
+          <p:cNvPicPr/>
+          <p:nvPr/>
+        </p:nvPicPr>
+        <p:blipFill>
+          <a:blip r:embed="rId5" cstate="print">
+            <a:extLst>
+              <a:ext uri="{28A0092B-C50C-407E-A947-70E740481C1C}">
+                <a14:useLocalDpi xmlns:a14="http://schemas.microsoft.com/office/drawing/2010/main" val="0"/>
+              </a:ext>
+            </a:extLst>
+          </a:blip>
+          <a:srcRect/>
+          <a:stretch>
+            <a:fillRect/>
+          </a:stretch>
+        </p:blipFill>
+        <p:spPr bwMode="auto">
+          <a:xfrm>
+            <a:off x="1021889" y="4827104"/>
+            <a:ext cx="2836561" cy="1513674"/>
+          </a:xfrm>
+          <a:prstGeom prst="rect">
+            <a:avLst/>
+          </a:prstGeom>
+          <a:noFill/>
+          <a:ln>
+            <a:noFill/>
+          </a:ln>
+        </p:spPr>
+      </p:pic>
+      <p:pic>
+        <p:nvPicPr>
+          <p:cNvPr id="11" name="Imagen 10" descr="Resultado de imagen de laravel composer descargar">
+            <a:extLst>
+              <a:ext uri="{FF2B5EF4-FFF2-40B4-BE49-F238E27FC236}">
+                <a16:creationId xmlns:a16="http://schemas.microsoft.com/office/drawing/2014/main" id="{0E2C7504-8790-4654-A107-86BC022C764A}"/>
+              </a:ext>
+            </a:extLst>
+          </p:cNvPr>
+          <p:cNvPicPr/>
+          <p:nvPr/>
+        </p:nvPicPr>
+        <p:blipFill>
+          <a:blip r:embed="rId6">
+            <a:extLst>
+              <a:ext uri="{28A0092B-C50C-407E-A947-70E740481C1C}">
+                <a14:useLocalDpi xmlns:a14="http://schemas.microsoft.com/office/drawing/2010/main" val="0"/>
+              </a:ext>
+            </a:extLst>
+          </a:blip>
+          <a:srcRect/>
+          <a:stretch>
+            <a:fillRect/>
+          </a:stretch>
+        </p:blipFill>
+        <p:spPr bwMode="auto">
+          <a:xfrm>
+            <a:off x="4013716" y="3725704"/>
+            <a:ext cx="3018155" cy="2353310"/>
+          </a:xfrm>
+          <a:prstGeom prst="rect">
+            <a:avLst/>
+          </a:prstGeom>
+          <a:noFill/>
+          <a:ln>
+            <a:noFill/>
+          </a:ln>
+        </p:spPr>
+      </p:pic>
+      <p:pic>
+        <p:nvPicPr>
+          <p:cNvPr id="12" name="Imagen 11">
+            <a:extLst>
+              <a:ext uri="{FF2B5EF4-FFF2-40B4-BE49-F238E27FC236}">
+                <a16:creationId xmlns:a16="http://schemas.microsoft.com/office/drawing/2014/main" id="{EEF7EF64-27C9-4D08-B6B7-50790D40E8FD}"/>
+              </a:ext>
+            </a:extLst>
+          </p:cNvPr>
+          <p:cNvPicPr/>
+          <p:nvPr/>
+        </p:nvPicPr>
+        <p:blipFill>
+          <a:blip r:embed="rId7">
+            <a:extLst>
+              <a:ext uri="{28A0092B-C50C-407E-A947-70E740481C1C}">
+                <a14:useLocalDpi xmlns:a14="http://schemas.microsoft.com/office/drawing/2010/main" val="0"/>
+              </a:ext>
+            </a:extLst>
+          </a:blip>
+          <a:stretch>
+            <a:fillRect/>
+          </a:stretch>
+        </p:blipFill>
+        <p:spPr>
+          <a:xfrm>
+            <a:off x="8815553" y="3510785"/>
+            <a:ext cx="2823544" cy="1372352"/>
+          </a:xfrm>
+          <a:prstGeom prst="rect">
+            <a:avLst/>
+          </a:prstGeom>
+        </p:spPr>
+      </p:pic>
     </p:spTree>
     <p:extLst>
       <p:ext uri="{BB962C8B-B14F-4D97-AF65-F5344CB8AC3E}">
@@ -7170,7 +8546,7 @@
 </p:sld>
 </file>
 
-<file path=ppt/slides/slide17.xml><?xml version="1.0" encoding="utf-8"?>
+<file path=ppt/slides/slide18.xml><?xml version="1.0" encoding="utf-8"?>
 <p:sld xmlns:a="http://schemas.openxmlformats.org/drawingml/2006/main" xmlns:r="http://schemas.openxmlformats.org/officeDocument/2006/relationships" xmlns:p="http://schemas.openxmlformats.org/presentationml/2006/main">
   <p:cSld>
     <p:bg>
@@ -7876,6 +9252,54 @@
             <a:pPr marL="0" indent="0">
               <a:buNone/>
             </a:pPr>
+            <a:r>
+              <a:rPr lang="es-ES" sz="2400" b="1" dirty="0">
+                <a:latin typeface="Century Gothic" panose="020B0502020202020204" pitchFamily="34" charset="0"/>
+              </a:rPr>
+              <a:t>PHP: </a:t>
+            </a:r>
+            <a:r>
+              <a:rPr lang="es-ES" dirty="0">
+                <a:latin typeface="Century Gothic" panose="020B0502020202020204" pitchFamily="34" charset="0"/>
+              </a:rPr>
+              <a:t>lenguaje de programación multiplataforma.</a:t>
+            </a:r>
+            <a:endParaRPr lang="es-ES" sz="2400" b="1" dirty="0">
+              <a:latin typeface="Century Gothic" panose="020B0502020202020204" pitchFamily="34" charset="0"/>
+            </a:endParaRPr>
+          </a:p>
+          <a:p>
+            <a:pPr marL="0" indent="0">
+              <a:buNone/>
+            </a:pPr>
+            <a:endParaRPr lang="es-ES" sz="2400" b="1" dirty="0">
+              <a:latin typeface="Century Gothic" panose="020B0502020202020204" pitchFamily="34" charset="0"/>
+            </a:endParaRPr>
+          </a:p>
+          <a:p>
+            <a:pPr marL="0" indent="0">
+              <a:buNone/>
+            </a:pPr>
+            <a:endParaRPr lang="es-ES" sz="2400" b="1" dirty="0">
+              <a:latin typeface="Century Gothic" panose="020B0502020202020204" pitchFamily="34" charset="0"/>
+            </a:endParaRPr>
+          </a:p>
+          <a:p>
+            <a:pPr marL="0" indent="0">
+              <a:buNone/>
+            </a:pPr>
+            <a:r>
+              <a:rPr lang="es-ES" sz="2400" b="1" dirty="0">
+                <a:latin typeface="Century Gothic" panose="020B0502020202020204" pitchFamily="34" charset="0"/>
+              </a:rPr>
+              <a:t>Framework: </a:t>
+            </a:r>
+            <a:r>
+              <a:rPr lang="es-ES" dirty="0">
+                <a:latin typeface="Century Gothic" panose="020B0502020202020204" pitchFamily="34" charset="0"/>
+              </a:rPr>
+              <a:t>esquema o estructura que se establece y se aprovecha para desarrollar y organizar un software.</a:t>
+            </a:r>
             <a:endParaRPr lang="es-ES" sz="2400" b="1" dirty="0">
               <a:latin typeface="Century Gothic" panose="020B0502020202020204" pitchFamily="34" charset="0"/>
             </a:endParaRPr>
@@ -7896,6 +9320,269 @@
 </file>
 
 <file path=ppt/slides/slide5.xml><?xml version="1.0" encoding="utf-8"?>
+<p:sld xmlns:a="http://schemas.openxmlformats.org/drawingml/2006/main" xmlns:r="http://schemas.openxmlformats.org/officeDocument/2006/relationships" xmlns:p="http://schemas.openxmlformats.org/presentationml/2006/main">
+  <p:cSld>
+    <p:bg>
+      <p:bgPr>
+        <a:solidFill>
+          <a:srgbClr val="EEF3F6"/>
+        </a:solidFill>
+        <a:effectLst/>
+      </p:bgPr>
+    </p:bg>
+    <p:spTree>
+      <p:nvGrpSpPr>
+        <p:cNvPr id="1" name=""/>
+        <p:cNvGrpSpPr/>
+        <p:nvPr/>
+      </p:nvGrpSpPr>
+      <p:grpSpPr>
+        <a:xfrm>
+          <a:off x="0" y="0"/>
+          <a:ext cx="0" cy="0"/>
+          <a:chOff x="0" y="0"/>
+          <a:chExt cx="0" cy="0"/>
+        </a:xfrm>
+      </p:grpSpPr>
+      <p:sp>
+        <p:nvSpPr>
+          <p:cNvPr id="2" name="Título 1">
+            <a:extLst>
+              <a:ext uri="{FF2B5EF4-FFF2-40B4-BE49-F238E27FC236}">
+                <a16:creationId xmlns:a16="http://schemas.microsoft.com/office/drawing/2014/main" id="{0C7E543A-8DFC-45E7-A715-ABC32566D44D}"/>
+              </a:ext>
+            </a:extLst>
+          </p:cNvPr>
+          <p:cNvSpPr>
+            <a:spLocks noGrp="1"/>
+          </p:cNvSpPr>
+          <p:nvPr>
+            <p:ph type="title"/>
+          </p:nvPr>
+        </p:nvSpPr>
+        <p:spPr/>
+        <p:txBody>
+          <a:bodyPr/>
+          <a:lstStyle/>
+          <a:p>
+            <a:r>
+              <a:rPr lang="es-ES" b="1" dirty="0">
+                <a:latin typeface="Century Gothic" panose="020B0502020202020204" pitchFamily="34" charset="0"/>
+              </a:rPr>
+              <a:t>Descripción del la tecnología</a:t>
+            </a:r>
+            <a:endParaRPr lang="es-ES_tradnl" b="1" dirty="0">
+              <a:latin typeface="Century Gothic" panose="020B0502020202020204" pitchFamily="34" charset="0"/>
+            </a:endParaRPr>
+          </a:p>
+        </p:txBody>
+      </p:sp>
+      <p:sp>
+        <p:nvSpPr>
+          <p:cNvPr id="3" name="Marcador de contenido 2">
+            <a:extLst>
+              <a:ext uri="{FF2B5EF4-FFF2-40B4-BE49-F238E27FC236}">
+                <a16:creationId xmlns:a16="http://schemas.microsoft.com/office/drawing/2014/main" id="{64B916E8-0FED-428A-B9CA-55994CE8B4C8}"/>
+              </a:ext>
+            </a:extLst>
+          </p:cNvPr>
+          <p:cNvSpPr>
+            <a:spLocks noGrp="1"/>
+          </p:cNvSpPr>
+          <p:nvPr>
+            <p:ph idx="1"/>
+          </p:nvPr>
+        </p:nvSpPr>
+        <p:spPr>
+          <a:xfrm>
+            <a:off x="1120140" y="1428750"/>
+            <a:ext cx="10607040" cy="5004582"/>
+          </a:xfrm>
+        </p:spPr>
+        <p:txBody>
+          <a:bodyPr/>
+          <a:lstStyle/>
+          <a:p>
+            <a:pPr marL="0" indent="0">
+              <a:buNone/>
+            </a:pPr>
+            <a:r>
+              <a:rPr lang="es-ES" b="1" dirty="0">
+                <a:latin typeface="Century Gothic" panose="020B0502020202020204" pitchFamily="34" charset="0"/>
+              </a:rPr>
+              <a:t>VENTAJAS DE USAR UN FRAMEWORK:</a:t>
+            </a:r>
+          </a:p>
+          <a:p>
+            <a:r>
+              <a:rPr lang="es-ES" b="1" dirty="0">
+                <a:latin typeface="Century Gothic" panose="020B0502020202020204" pitchFamily="34" charset="0"/>
+              </a:rPr>
+              <a:t>Patrones de diseño (Modelo Vista Controlador): </a:t>
+            </a:r>
+            <a:r>
+              <a:rPr lang="es-ES" dirty="0">
+                <a:latin typeface="Century Gothic" panose="020B0502020202020204" pitchFamily="34" charset="0"/>
+              </a:rPr>
+              <a:t>permite estructurar la aplicación.</a:t>
+            </a:r>
+            <a:endParaRPr lang="es-ES" b="1" dirty="0">
+              <a:latin typeface="Century Gothic" panose="020B0502020202020204" pitchFamily="34" charset="0"/>
+            </a:endParaRPr>
+          </a:p>
+          <a:p>
+            <a:r>
+              <a:rPr lang="es-ES" b="1" dirty="0">
+                <a:latin typeface="Century Gothic" panose="020B0502020202020204" pitchFamily="34" charset="0"/>
+              </a:rPr>
+              <a:t>Librerías: </a:t>
+            </a:r>
+            <a:r>
+              <a:rPr lang="es-ES" dirty="0">
+                <a:latin typeface="Century Gothic" panose="020B0502020202020204" pitchFamily="34" charset="0"/>
+              </a:rPr>
+              <a:t>facilitan funciones repetitivas.</a:t>
+            </a:r>
+            <a:endParaRPr lang="es-ES" b="1" dirty="0">
+              <a:latin typeface="Century Gothic" panose="020B0502020202020204" pitchFamily="34" charset="0"/>
+            </a:endParaRPr>
+          </a:p>
+          <a:p>
+            <a:r>
+              <a:rPr lang="es-ES" b="1" dirty="0">
+                <a:latin typeface="Century Gothic" panose="020B0502020202020204" pitchFamily="34" charset="0"/>
+              </a:rPr>
+              <a:t>Seguridad: </a:t>
+            </a:r>
+            <a:r>
+              <a:rPr lang="es-ES" dirty="0">
+                <a:latin typeface="Century Gothic" panose="020B0502020202020204" pitchFamily="34" charset="0"/>
+              </a:rPr>
+              <a:t>gran apoyo y </a:t>
+            </a:r>
+            <a:r>
+              <a:rPr lang="es-ES" dirty="0" err="1">
+                <a:latin typeface="Century Gothic" panose="020B0502020202020204" pitchFamily="34" charset="0"/>
+              </a:rPr>
+              <a:t>testing</a:t>
+            </a:r>
+            <a:r>
+              <a:rPr lang="es-ES" dirty="0">
+                <a:latin typeface="Century Gothic" panose="020B0502020202020204" pitchFamily="34" charset="0"/>
+              </a:rPr>
+              <a:t> por parte de los desarrolladores.</a:t>
+            </a:r>
+            <a:endParaRPr lang="es-ES" b="1" dirty="0">
+              <a:latin typeface="Century Gothic" panose="020B0502020202020204" pitchFamily="34" charset="0"/>
+            </a:endParaRPr>
+          </a:p>
+          <a:p>
+            <a:r>
+              <a:rPr lang="es-ES" b="1" dirty="0">
+                <a:latin typeface="Century Gothic" panose="020B0502020202020204" pitchFamily="34" charset="0"/>
+              </a:rPr>
+              <a:t>Código limpio y ordenado: </a:t>
+            </a:r>
+            <a:r>
+              <a:rPr lang="es-ES" dirty="0">
+                <a:latin typeface="Century Gothic" panose="020B0502020202020204" pitchFamily="34" charset="0"/>
+              </a:rPr>
+              <a:t>gracias al patrón de diseño.</a:t>
+            </a:r>
+          </a:p>
+          <a:p>
+            <a:r>
+              <a:rPr lang="es-ES" b="1" dirty="0">
+                <a:latin typeface="Century Gothic" panose="020B0502020202020204" pitchFamily="34" charset="0"/>
+              </a:rPr>
+              <a:t>Código mantenible: </a:t>
+            </a:r>
+            <a:r>
+              <a:rPr lang="es-ES" dirty="0">
+                <a:latin typeface="Century Gothic" panose="020B0502020202020204" pitchFamily="34" charset="0"/>
+              </a:rPr>
+              <a:t>reutilización de código.</a:t>
+            </a:r>
+            <a:endParaRPr lang="es-ES" b="1" dirty="0">
+              <a:latin typeface="Century Gothic" panose="020B0502020202020204" pitchFamily="34" charset="0"/>
+            </a:endParaRPr>
+          </a:p>
+          <a:p>
+            <a:r>
+              <a:rPr lang="es-ES" b="1" dirty="0">
+                <a:latin typeface="Century Gothic" panose="020B0502020202020204" pitchFamily="34" charset="0"/>
+              </a:rPr>
+              <a:t>Buenas prácticas: </a:t>
+            </a:r>
+            <a:r>
+              <a:rPr lang="es-ES" dirty="0">
+                <a:latin typeface="Century Gothic" panose="020B0502020202020204" pitchFamily="34" charset="0"/>
+              </a:rPr>
+              <a:t>crecer como desarrolladores.</a:t>
+            </a:r>
+          </a:p>
+          <a:p>
+            <a:r>
+              <a:rPr lang="es-ES" b="1" dirty="0">
+                <a:latin typeface="Century Gothic" panose="020B0502020202020204" pitchFamily="34" charset="0"/>
+              </a:rPr>
+              <a:t>Comunidad: </a:t>
+            </a:r>
+            <a:r>
+              <a:rPr lang="es-ES" dirty="0">
+                <a:latin typeface="Century Gothic" panose="020B0502020202020204" pitchFamily="34" charset="0"/>
+              </a:rPr>
+              <a:t>para sugerir mejoras.</a:t>
+            </a:r>
+            <a:endParaRPr lang="es-ES" b="1" dirty="0">
+              <a:latin typeface="Century Gothic" panose="020B0502020202020204" pitchFamily="34" charset="0"/>
+            </a:endParaRPr>
+          </a:p>
+          <a:p>
+            <a:r>
+              <a:rPr lang="es-ES" b="1" dirty="0">
+                <a:latin typeface="Century Gothic" panose="020B0502020202020204" pitchFamily="34" charset="0"/>
+              </a:rPr>
+              <a:t>Integración con otras herramientas: </a:t>
+            </a:r>
+            <a:r>
+              <a:rPr lang="es-ES" dirty="0">
+                <a:latin typeface="Century Gothic" panose="020B0502020202020204" pitchFamily="34" charset="0"/>
+              </a:rPr>
+              <a:t>se puede integrar con otros </a:t>
+            </a:r>
+            <a:r>
+              <a:rPr lang="es-ES" dirty="0" err="1">
+                <a:latin typeface="Century Gothic" panose="020B0502020202020204" pitchFamily="34" charset="0"/>
+              </a:rPr>
+              <a:t>frameworks</a:t>
+            </a:r>
+            <a:r>
+              <a:rPr lang="es-ES" dirty="0">
+                <a:latin typeface="Century Gothic" panose="020B0502020202020204" pitchFamily="34" charset="0"/>
+              </a:rPr>
+              <a:t>.</a:t>
+            </a:r>
+            <a:endParaRPr lang="es-ES_tradnl" b="1" dirty="0">
+              <a:latin typeface="Century Gothic" panose="020B0502020202020204" pitchFamily="34" charset="0"/>
+            </a:endParaRPr>
+          </a:p>
+        </p:txBody>
+      </p:sp>
+    </p:spTree>
+    <p:extLst>
+      <p:ext uri="{BB962C8B-B14F-4D97-AF65-F5344CB8AC3E}">
+        <p14:creationId xmlns:p14="http://schemas.microsoft.com/office/powerpoint/2010/main" val="2628082939"/>
+      </p:ext>
+    </p:extLst>
+  </p:cSld>
+  <p:clrMapOvr>
+    <a:masterClrMapping/>
+  </p:clrMapOvr>
+</p:sld>
+</file>
+
+<file path=ppt/slides/slide6.xml><?xml version="1.0" encoding="utf-8"?>
 <p:sld xmlns:a="http://schemas.openxmlformats.org/drawingml/2006/main" xmlns:r="http://schemas.openxmlformats.org/officeDocument/2006/relationships" xmlns:p="http://schemas.openxmlformats.org/presentationml/2006/main">
   <p:cSld>
     <p:bg>
@@ -8432,7 +10119,7 @@
 </p:sld>
 </file>
 
-<file path=ppt/slides/slide6.xml><?xml version="1.0" encoding="utf-8"?>
+<file path=ppt/slides/slide7.xml><?xml version="1.0" encoding="utf-8"?>
 <p:sld xmlns:a="http://schemas.openxmlformats.org/drawingml/2006/main" xmlns:r="http://schemas.openxmlformats.org/officeDocument/2006/relationships" xmlns:p="http://schemas.openxmlformats.org/presentationml/2006/main">
   <p:cSld>
     <p:bg>
@@ -9087,7 +10774,7 @@
 </p:sld>
 </file>
 
-<file path=ppt/slides/slide7.xml><?xml version="1.0" encoding="utf-8"?>
+<file path=ppt/slides/slide8.xml><?xml version="1.0" encoding="utf-8"?>
 <p:sld xmlns:a="http://schemas.openxmlformats.org/drawingml/2006/main" xmlns:r="http://schemas.openxmlformats.org/officeDocument/2006/relationships" xmlns:p="http://schemas.openxmlformats.org/presentationml/2006/main">
   <p:cSld>
     <p:bg>
@@ -9560,7 +11247,7 @@
 </p:sld>
 </file>
 
-<file path=ppt/slides/slide8.xml><?xml version="1.0" encoding="utf-8"?>
+<file path=ppt/slides/slide9.xml><?xml version="1.0" encoding="utf-8"?>
 <p:sld xmlns:a="http://schemas.openxmlformats.org/drawingml/2006/main" xmlns:r="http://schemas.openxmlformats.org/officeDocument/2006/relationships" xmlns:p="http://schemas.openxmlformats.org/presentationml/2006/main">
   <p:cSld>
     <p:bg>
@@ -9664,8 +11351,17 @@
               <a:rPr lang="es-ES" sz="2400" b="1" dirty="0">
                 <a:latin typeface="Century Gothic" panose="020B0502020202020204" pitchFamily="34" charset="0"/>
               </a:rPr>
-              <a:t>Herramientas utilizadas:</a:t>
-            </a:r>
+              <a:t>Herramientas utilizadas: Google y Google </a:t>
+            </a:r>
+            <a:r>
+              <a:rPr lang="es-ES" sz="2400" b="1" dirty="0" err="1">
+                <a:latin typeface="Century Gothic" panose="020B0502020202020204" pitchFamily="34" charset="0"/>
+              </a:rPr>
+              <a:t>Scholar</a:t>
+            </a:r>
+            <a:endParaRPr lang="es-ES" sz="2400" b="1" dirty="0">
+              <a:latin typeface="Century Gothic" panose="020B0502020202020204" pitchFamily="34" charset="0"/>
+            </a:endParaRPr>
           </a:p>
         </p:txBody>
       </p:sp>
@@ -9888,49 +11584,15 @@
             </a:lvl9pPr>
           </a:lstStyle>
           <a:p>
-            <a:pPr marL="457200" indent="-457200">
-              <a:buFont typeface="+mj-lt"/>
-              <a:buAutoNum type="arabicPeriod"/>
+            <a:pPr marL="0" indent="0">
+              <a:buNone/>
             </a:pPr>
-            <a:r>
-              <a:rPr lang="es-ES" sz="2400" b="1" dirty="0">
-                <a:solidFill>
-                  <a:schemeClr val="tx1"/>
-                </a:solidFill>
-                <a:latin typeface="Century Gothic" panose="020B0502020202020204" pitchFamily="34" charset="0"/>
-              </a:rPr>
-              <a:t> </a:t>
-            </a:r>
-          </a:p>
-          <a:p>
-            <a:pPr marL="457200" indent="-457200">
-              <a:buFont typeface="+mj-lt"/>
-              <a:buAutoNum type="arabicPeriod"/>
-            </a:pPr>
-            <a:r>
-              <a:rPr lang="es-ES" sz="2400" b="1" dirty="0">
-                <a:solidFill>
-                  <a:schemeClr val="tx1"/>
-                </a:solidFill>
-                <a:latin typeface="Century Gothic" panose="020B0502020202020204" pitchFamily="34" charset="0"/>
-              </a:rPr>
-              <a:t> </a:t>
-            </a:r>
-          </a:p>
-          <a:p>
-            <a:pPr marL="457200" indent="-457200">
-              <a:buFont typeface="+mj-lt"/>
-              <a:buAutoNum type="arabicPeriod"/>
-            </a:pPr>
-            <a:r>
-              <a:rPr lang="es-ES" sz="2400" b="1" dirty="0">
-                <a:solidFill>
-                  <a:schemeClr val="tx1"/>
-                </a:solidFill>
-                <a:latin typeface="Century Gothic" panose="020B0502020202020204" pitchFamily="34" charset="0"/>
-              </a:rPr>
-              <a:t> </a:t>
-            </a:r>
+            <a:endParaRPr lang="es-ES" sz="2400" b="1" dirty="0">
+              <a:solidFill>
+                <a:schemeClr val="tx1"/>
+              </a:solidFill>
+              <a:latin typeface="Century Gothic" panose="020B0502020202020204" pitchFamily="34" charset="0"/>
+            </a:endParaRPr>
           </a:p>
         </p:txBody>
       </p:sp>
@@ -9981,415 +11643,20 @@
           </a:extLst>
         </p:spPr>
       </p:pic>
-    </p:spTree>
-    <p:extLst>
-      <p:ext uri="{BB962C8B-B14F-4D97-AF65-F5344CB8AC3E}">
-        <p14:creationId xmlns:p14="http://schemas.microsoft.com/office/powerpoint/2010/main" val="456257309"/>
-      </p:ext>
-    </p:extLst>
-  </p:cSld>
-  <p:clrMapOvr>
-    <a:masterClrMapping/>
-  </p:clrMapOvr>
-</p:sld>
-</file>
-
-<file path=ppt/slides/slide9.xml><?xml version="1.0" encoding="utf-8"?>
-<p:sld xmlns:a="http://schemas.openxmlformats.org/drawingml/2006/main" xmlns:r="http://schemas.openxmlformats.org/officeDocument/2006/relationships" xmlns:p="http://schemas.openxmlformats.org/presentationml/2006/main">
-  <p:cSld>
-    <p:bg>
-      <p:bgPr>
-        <a:solidFill>
-          <a:srgbClr val="EBF1F5"/>
-        </a:solidFill>
-        <a:effectLst/>
-      </p:bgPr>
-    </p:bg>
-    <p:spTree>
-      <p:nvGrpSpPr>
-        <p:cNvPr id="1" name=""/>
-        <p:cNvGrpSpPr/>
-        <p:nvPr/>
-      </p:nvGrpSpPr>
-      <p:grpSpPr>
-        <a:xfrm>
-          <a:off x="0" y="0"/>
-          <a:ext cx="0" cy="0"/>
-          <a:chOff x="0" y="0"/>
-          <a:chExt cx="0" cy="0"/>
-        </a:xfrm>
-      </p:grpSpPr>
-      <p:sp>
-        <p:nvSpPr>
-          <p:cNvPr id="2" name="Título 1">
+      <p:pic>
+        <p:nvPicPr>
+          <p:cNvPr id="6" name="Imagen 5" descr="https://i.gyazo.com/b5b59baa27c81b9afdb57d0535af3087.png">
             <a:extLst>
               <a:ext uri="{FF2B5EF4-FFF2-40B4-BE49-F238E27FC236}">
-                <a16:creationId xmlns:a16="http://schemas.microsoft.com/office/drawing/2014/main" id="{67625ECE-3F3D-4827-8CD9-4C1D83085BDC}"/>
+                <a16:creationId xmlns:a16="http://schemas.microsoft.com/office/drawing/2014/main" id="{C0C3C39F-D04D-4884-B041-D85656547467}"/>
               </a:ext>
             </a:extLst>
           </p:cNvPr>
-          <p:cNvSpPr>
-            <a:spLocks noGrp="1"/>
-          </p:cNvSpPr>
-          <p:nvPr>
-            <p:ph type="title"/>
-          </p:nvPr>
-        </p:nvSpPr>
-        <p:spPr/>
-        <p:txBody>
-          <a:bodyPr/>
-          <a:lstStyle/>
-          <a:p>
-            <a:r>
-              <a:rPr lang="es-ES" b="1" dirty="0">
-                <a:latin typeface="Century Gothic" panose="020B0502020202020204" pitchFamily="34" charset="0"/>
-              </a:rPr>
-              <a:t>Cursos NO gratuitos</a:t>
-            </a:r>
-            <a:br>
-              <a:rPr lang="es-ES" b="1" dirty="0">
-                <a:latin typeface="Century Gothic" panose="020B0502020202020204" pitchFamily="34" charset="0"/>
-              </a:rPr>
-            </a:br>
-            <a:r>
-              <a:rPr lang="es-ES" sz="2400" b="1" dirty="0">
-                <a:latin typeface="Century Gothic" panose="020B0502020202020204" pitchFamily="34" charset="0"/>
-              </a:rPr>
-              <a:t>Tecnología específica: </a:t>
-            </a:r>
-            <a:r>
-              <a:rPr lang="es-ES" sz="2400" b="1" dirty="0" err="1">
-                <a:latin typeface="Century Gothic" panose="020B0502020202020204" pitchFamily="34" charset="0"/>
-              </a:rPr>
-              <a:t>Yii</a:t>
-            </a:r>
-            <a:endParaRPr lang="es-ES" b="1" dirty="0">
-              <a:latin typeface="Century Gothic" panose="020B0502020202020204" pitchFamily="34" charset="0"/>
-            </a:endParaRPr>
-          </a:p>
-        </p:txBody>
-      </p:sp>
-      <p:sp>
-        <p:nvSpPr>
-          <p:cNvPr id="3" name="Marcador de contenido 2">
-            <a:extLst>
-              <a:ext uri="{FF2B5EF4-FFF2-40B4-BE49-F238E27FC236}">
-                <a16:creationId xmlns:a16="http://schemas.microsoft.com/office/drawing/2014/main" id="{E00791BC-910E-46E2-ACBE-7F7487770480}"/>
-              </a:ext>
-            </a:extLst>
-          </p:cNvPr>
-          <p:cNvSpPr>
-            <a:spLocks noGrp="1"/>
-          </p:cNvSpPr>
-          <p:nvPr>
-            <p:ph idx="1"/>
-          </p:nvPr>
-        </p:nvSpPr>
-        <p:spPr>
-          <a:xfrm>
-            <a:off x="2567940" y="2171700"/>
-            <a:ext cx="9601200" cy="483704"/>
-          </a:xfrm>
-        </p:spPr>
-        <p:txBody>
-          <a:bodyPr>
-            <a:normAutofit/>
-          </a:bodyPr>
-          <a:lstStyle/>
-          <a:p>
-            <a:pPr marL="0" indent="0">
-              <a:buNone/>
-            </a:pPr>
-            <a:r>
-              <a:rPr lang="es-ES" sz="2400" b="1" dirty="0">
-                <a:latin typeface="Century Gothic" panose="020B0502020202020204" pitchFamily="34" charset="0"/>
-              </a:rPr>
-              <a:t>Herramientas utilizadas:</a:t>
-            </a:r>
-          </a:p>
-        </p:txBody>
-      </p:sp>
-      <p:sp>
-        <p:nvSpPr>
-          <p:cNvPr id="9" name="Marcador de contenido 2">
-            <a:extLst>
-              <a:ext uri="{FF2B5EF4-FFF2-40B4-BE49-F238E27FC236}">
-                <a16:creationId xmlns:a16="http://schemas.microsoft.com/office/drawing/2014/main" id="{D1EFBA3E-5E6D-45BB-86A8-AE203160817B}"/>
-              </a:ext>
-            </a:extLst>
-          </p:cNvPr>
-          <p:cNvSpPr txBox="1">
-            <a:spLocks/>
-          </p:cNvSpPr>
-          <p:nvPr/>
-        </p:nvSpPr>
-        <p:spPr>
-          <a:xfrm>
-            <a:off x="1539240" y="3429000"/>
-            <a:ext cx="9601200" cy="2160103"/>
-          </a:xfrm>
-          <a:prstGeom prst="rect">
-            <a:avLst/>
-          </a:prstGeom>
-        </p:spPr>
-        <p:txBody>
-          <a:bodyPr vert="horz" lIns="91440" tIns="45720" rIns="91440" bIns="45720" rtlCol="0">
-            <a:normAutofit/>
-          </a:bodyPr>
-          <a:lstStyle>
-            <a:lvl1pPr marL="384048" indent="-384048" algn="l" defTabSz="914400" rtl="0" eaLnBrk="1" latinLnBrk="0" hangingPunct="1">
-              <a:lnSpc>
-                <a:spcPct val="94000"/>
-              </a:lnSpc>
-              <a:spcBef>
-                <a:spcPts val="1000"/>
-              </a:spcBef>
-              <a:spcAft>
-                <a:spcPts val="200"/>
-              </a:spcAft>
-              <a:buFont typeface="Franklin Gothic Book" panose="020B0503020102020204" pitchFamily="34" charset="0"/>
-              <a:buChar char="■"/>
-              <a:defRPr sz="2000" kern="1200" baseline="0">
-                <a:solidFill>
-                  <a:schemeClr val="tx2"/>
-                </a:solidFill>
-                <a:latin typeface="+mn-lt"/>
-                <a:ea typeface="+mn-ea"/>
-                <a:cs typeface="+mn-cs"/>
-              </a:defRPr>
-            </a:lvl1pPr>
-            <a:lvl2pPr marL="914400" indent="-384048" algn="l" defTabSz="914400" rtl="0" eaLnBrk="1" latinLnBrk="0" hangingPunct="1">
-              <a:lnSpc>
-                <a:spcPct val="94000"/>
-              </a:lnSpc>
-              <a:spcBef>
-                <a:spcPts val="500"/>
-              </a:spcBef>
-              <a:spcAft>
-                <a:spcPts val="200"/>
-              </a:spcAft>
-              <a:buFont typeface="Franklin Gothic Book" panose="020B0503020102020204" pitchFamily="34" charset="0"/>
-              <a:buChar char="–"/>
-              <a:defRPr sz="2000" i="1" kern="1200" baseline="0">
-                <a:solidFill>
-                  <a:schemeClr val="tx2"/>
-                </a:solidFill>
-                <a:latin typeface="+mn-lt"/>
-                <a:ea typeface="+mn-ea"/>
-                <a:cs typeface="+mn-cs"/>
-              </a:defRPr>
-            </a:lvl2pPr>
-            <a:lvl3pPr marL="1371600" indent="-384048" algn="l" defTabSz="914400" rtl="0" eaLnBrk="1" latinLnBrk="0" hangingPunct="1">
-              <a:lnSpc>
-                <a:spcPct val="94000"/>
-              </a:lnSpc>
-              <a:spcBef>
-                <a:spcPts val="500"/>
-              </a:spcBef>
-              <a:spcAft>
-                <a:spcPts val="200"/>
-              </a:spcAft>
-              <a:buFont typeface="Franklin Gothic Book" panose="020B0503020102020204" pitchFamily="34" charset="0"/>
-              <a:buChar char="■"/>
-              <a:defRPr sz="1800" kern="1200" baseline="0">
-                <a:solidFill>
-                  <a:schemeClr val="tx2"/>
-                </a:solidFill>
-                <a:latin typeface="+mn-lt"/>
-                <a:ea typeface="+mn-ea"/>
-                <a:cs typeface="+mn-cs"/>
-              </a:defRPr>
-            </a:lvl3pPr>
-            <a:lvl4pPr marL="1828800" indent="-384048" algn="l" defTabSz="914400" rtl="0" eaLnBrk="1" latinLnBrk="0" hangingPunct="1">
-              <a:lnSpc>
-                <a:spcPct val="94000"/>
-              </a:lnSpc>
-              <a:spcBef>
-                <a:spcPts val="500"/>
-              </a:spcBef>
-              <a:spcAft>
-                <a:spcPts val="200"/>
-              </a:spcAft>
-              <a:buFont typeface="Franklin Gothic Book" panose="020B0503020102020204" pitchFamily="34" charset="0"/>
-              <a:buChar char="–"/>
-              <a:defRPr sz="1800" i="1" kern="1200" baseline="0">
-                <a:solidFill>
-                  <a:schemeClr val="tx2"/>
-                </a:solidFill>
-                <a:latin typeface="+mn-lt"/>
-                <a:ea typeface="+mn-ea"/>
-                <a:cs typeface="+mn-cs"/>
-              </a:defRPr>
-            </a:lvl4pPr>
-            <a:lvl5pPr marL="2286000" indent="-384048" algn="l" defTabSz="914400" rtl="0" eaLnBrk="1" latinLnBrk="0" hangingPunct="1">
-              <a:lnSpc>
-                <a:spcPct val="94000"/>
-              </a:lnSpc>
-              <a:spcBef>
-                <a:spcPts val="500"/>
-              </a:spcBef>
-              <a:spcAft>
-                <a:spcPts val="200"/>
-              </a:spcAft>
-              <a:buFont typeface="Franklin Gothic Book" panose="020B0503020102020204" pitchFamily="34" charset="0"/>
-              <a:buChar char="■"/>
-              <a:defRPr sz="1600" kern="1200" baseline="0">
-                <a:solidFill>
-                  <a:schemeClr val="tx2"/>
-                </a:solidFill>
-                <a:latin typeface="+mn-lt"/>
-                <a:ea typeface="+mn-ea"/>
-                <a:cs typeface="+mn-cs"/>
-              </a:defRPr>
-            </a:lvl5pPr>
-            <a:lvl6pPr marL="2743200" indent="-384048" algn="l" defTabSz="914400" rtl="0" eaLnBrk="1" latinLnBrk="0" hangingPunct="1">
-              <a:lnSpc>
-                <a:spcPct val="94000"/>
-              </a:lnSpc>
-              <a:spcBef>
-                <a:spcPts val="500"/>
-              </a:spcBef>
-              <a:spcAft>
-                <a:spcPts val="200"/>
-              </a:spcAft>
-              <a:buFont typeface="Franklin Gothic Book" panose="020B0503020102020204" pitchFamily="34" charset="0"/>
-              <a:buChar char="–"/>
-              <a:defRPr sz="1600" i="1" kern="1200" baseline="0">
-                <a:solidFill>
-                  <a:schemeClr val="tx2"/>
-                </a:solidFill>
-                <a:latin typeface="+mn-lt"/>
-                <a:ea typeface="+mn-ea"/>
-                <a:cs typeface="+mn-cs"/>
-              </a:defRPr>
-            </a:lvl6pPr>
-            <a:lvl7pPr marL="3200400" indent="-384048" algn="l" defTabSz="914400" rtl="0" eaLnBrk="1" latinLnBrk="0" hangingPunct="1">
-              <a:lnSpc>
-                <a:spcPct val="94000"/>
-              </a:lnSpc>
-              <a:spcBef>
-                <a:spcPts val="500"/>
-              </a:spcBef>
-              <a:spcAft>
-                <a:spcPts val="200"/>
-              </a:spcAft>
-              <a:buFont typeface="Franklin Gothic Book" panose="020B0503020102020204" pitchFamily="34" charset="0"/>
-              <a:buChar char="■"/>
-              <a:defRPr sz="1400" kern="1200" baseline="0">
-                <a:solidFill>
-                  <a:schemeClr val="tx2"/>
-                </a:solidFill>
-                <a:latin typeface="+mn-lt"/>
-                <a:ea typeface="+mn-ea"/>
-                <a:cs typeface="+mn-cs"/>
-              </a:defRPr>
-            </a:lvl7pPr>
-            <a:lvl8pPr marL="3657600" indent="-384048" algn="l" defTabSz="914400" rtl="0" eaLnBrk="1" latinLnBrk="0" hangingPunct="1">
-              <a:lnSpc>
-                <a:spcPct val="94000"/>
-              </a:lnSpc>
-              <a:spcBef>
-                <a:spcPts val="500"/>
-              </a:spcBef>
-              <a:spcAft>
-                <a:spcPts val="200"/>
-              </a:spcAft>
-              <a:buFont typeface="Franklin Gothic Book" panose="020B0503020102020204" pitchFamily="34" charset="0"/>
-              <a:buChar char="–"/>
-              <a:defRPr sz="1400" i="1" kern="1200" baseline="0">
-                <a:solidFill>
-                  <a:schemeClr val="tx2"/>
-                </a:solidFill>
-                <a:latin typeface="+mn-lt"/>
-                <a:ea typeface="+mn-ea"/>
-                <a:cs typeface="+mn-cs"/>
-              </a:defRPr>
-            </a:lvl8pPr>
-            <a:lvl9pPr marL="4114800" indent="-384048" algn="l" defTabSz="914400" rtl="0" eaLnBrk="1" latinLnBrk="0" hangingPunct="1">
-              <a:lnSpc>
-                <a:spcPct val="94000"/>
-              </a:lnSpc>
-              <a:spcBef>
-                <a:spcPts val="500"/>
-              </a:spcBef>
-              <a:spcAft>
-                <a:spcPts val="200"/>
-              </a:spcAft>
-              <a:buFont typeface="Franklin Gothic Book" panose="020B0503020102020204" pitchFamily="34" charset="0"/>
-              <a:buChar char="■"/>
-              <a:defRPr sz="1400" kern="1200" baseline="0">
-                <a:solidFill>
-                  <a:schemeClr val="tx2"/>
-                </a:solidFill>
-                <a:latin typeface="+mn-lt"/>
-                <a:ea typeface="+mn-ea"/>
-                <a:cs typeface="+mn-cs"/>
-              </a:defRPr>
-            </a:lvl9pPr>
-          </a:lstStyle>
-          <a:p>
-            <a:pPr marL="457200" indent="-457200">
-              <a:buFont typeface="+mj-lt"/>
-              <a:buAutoNum type="arabicPeriod"/>
-            </a:pPr>
-            <a:r>
-              <a:rPr lang="es-ES" sz="2400" b="1" dirty="0">
-                <a:solidFill>
-                  <a:schemeClr val="tx1"/>
-                </a:solidFill>
-                <a:latin typeface="Century Gothic" panose="020B0502020202020204" pitchFamily="34" charset="0"/>
-              </a:rPr>
-              <a:t> </a:t>
-            </a:r>
-          </a:p>
-          <a:p>
-            <a:pPr marL="457200" indent="-457200">
-              <a:buFont typeface="+mj-lt"/>
-              <a:buAutoNum type="arabicPeriod"/>
-            </a:pPr>
-            <a:r>
-              <a:rPr lang="es-ES" sz="2400" b="1" dirty="0">
-                <a:solidFill>
-                  <a:schemeClr val="tx1"/>
-                </a:solidFill>
-                <a:latin typeface="Century Gothic" panose="020B0502020202020204" pitchFamily="34" charset="0"/>
-              </a:rPr>
-              <a:t> </a:t>
-            </a:r>
-          </a:p>
-          <a:p>
-            <a:pPr marL="457200" indent="-457200">
-              <a:buFont typeface="+mj-lt"/>
-              <a:buAutoNum type="arabicPeriod"/>
-            </a:pPr>
-            <a:r>
-              <a:rPr lang="es-ES" sz="2400" b="1" dirty="0">
-                <a:solidFill>
-                  <a:schemeClr val="tx1"/>
-                </a:solidFill>
-                <a:latin typeface="Century Gothic" panose="020B0502020202020204" pitchFamily="34" charset="0"/>
-              </a:rPr>
-              <a:t> </a:t>
-            </a:r>
-          </a:p>
-        </p:txBody>
-      </p:sp>
-      <p:pic>
-        <p:nvPicPr>
-          <p:cNvPr id="2050" name="Picture 2" descr="Resultado de imagen de yii png">
-            <a:extLst>
-              <a:ext uri="{FF2B5EF4-FFF2-40B4-BE49-F238E27FC236}">
-                <a16:creationId xmlns:a16="http://schemas.microsoft.com/office/drawing/2014/main" id="{A48B450D-3AF0-429C-A374-BB09532B021B}"/>
-              </a:ext>
-            </a:extLst>
-          </p:cNvPr>
-          <p:cNvPicPr>
-            <a:picLocks noChangeAspect="1" noChangeArrowheads="1"/>
-          </p:cNvPicPr>
+          <p:cNvPicPr/>
           <p:nvPr/>
         </p:nvPicPr>
         <p:blipFill>
-          <a:blip r:embed="rId2">
+          <a:blip r:embed="rId3">
             <a:extLst>
               <a:ext uri="{28A0092B-C50C-407E-A947-70E740481C1C}">
                 <a14:useLocalDpi xmlns:a14="http://schemas.microsoft.com/office/drawing/2010/main" val="0"/>
@@ -10403,28 +11670,267 @@
         </p:blipFill>
         <p:spPr bwMode="auto">
           <a:xfrm>
-            <a:off x="9885045" y="0"/>
-            <a:ext cx="2175510" cy="2175510"/>
+            <a:off x="1342927" y="3428999"/>
+            <a:ext cx="1932011" cy="817967"/>
           </a:xfrm>
           <a:prstGeom prst="rect">
             <a:avLst/>
           </a:prstGeom>
           <a:noFill/>
-          <a:extLst>
-            <a:ext uri="{909E8E84-426E-40DD-AFC4-6F175D3DCCD1}">
-              <a14:hiddenFill xmlns:a14="http://schemas.microsoft.com/office/drawing/2010/main">
-                <a:solidFill>
-                  <a:srgbClr val="FFFFFF"/>
-                </a:solidFill>
-              </a14:hiddenFill>
-            </a:ext>
-          </a:extLst>
+          <a:ln>
+            <a:noFill/>
+          </a:ln>
         </p:spPr>
       </p:pic>
+      <p:pic>
+        <p:nvPicPr>
+          <p:cNvPr id="7" name="Imagen 6" descr="https://i.gyazo.com/8e519ff2667fdce25c645114b210b198.png">
+            <a:extLst>
+              <a:ext uri="{FF2B5EF4-FFF2-40B4-BE49-F238E27FC236}">
+                <a16:creationId xmlns:a16="http://schemas.microsoft.com/office/drawing/2014/main" id="{04711535-29A4-4677-972F-FC5E8FBCA504}"/>
+              </a:ext>
+            </a:extLst>
+          </p:cNvPr>
+          <p:cNvPicPr/>
+          <p:nvPr/>
+        </p:nvPicPr>
+        <p:blipFill>
+          <a:blip r:embed="rId4">
+            <a:extLst>
+              <a:ext uri="{28A0092B-C50C-407E-A947-70E740481C1C}">
+                <a14:useLocalDpi xmlns:a14="http://schemas.microsoft.com/office/drawing/2010/main" val="0"/>
+              </a:ext>
+            </a:extLst>
+          </a:blip>
+          <a:srcRect/>
+          <a:stretch>
+            <a:fillRect/>
+          </a:stretch>
+        </p:blipFill>
+        <p:spPr bwMode="auto">
+          <a:xfrm>
+            <a:off x="5334253" y="3837982"/>
+            <a:ext cx="1779043" cy="817967"/>
+          </a:xfrm>
+          <a:prstGeom prst="rect">
+            <a:avLst/>
+          </a:prstGeom>
+          <a:noFill/>
+          <a:ln>
+            <a:noFill/>
+          </a:ln>
+        </p:spPr>
+      </p:pic>
+      <p:pic>
+        <p:nvPicPr>
+          <p:cNvPr id="4" name="Imagen 3">
+            <a:extLst>
+              <a:ext uri="{FF2B5EF4-FFF2-40B4-BE49-F238E27FC236}">
+                <a16:creationId xmlns:a16="http://schemas.microsoft.com/office/drawing/2014/main" id="{57D05242-8B90-48CF-9210-A3C7C2F0E3EA}"/>
+              </a:ext>
+            </a:extLst>
+          </p:cNvPr>
+          <p:cNvPicPr>
+            <a:picLocks noChangeAspect="1"/>
+          </p:cNvPicPr>
+          <p:nvPr/>
+        </p:nvPicPr>
+        <p:blipFill>
+          <a:blip r:embed="rId5"/>
+          <a:stretch>
+            <a:fillRect/>
+          </a:stretch>
+        </p:blipFill>
+        <p:spPr>
+          <a:xfrm>
+            <a:off x="8883178" y="3101903"/>
+            <a:ext cx="2843033" cy="817967"/>
+          </a:xfrm>
+          <a:prstGeom prst="rect">
+            <a:avLst/>
+          </a:prstGeom>
+        </p:spPr>
+      </p:pic>
+      <p:sp>
+        <p:nvSpPr>
+          <p:cNvPr id="5" name="CuadroTexto 4">
+            <a:extLst>
+              <a:ext uri="{FF2B5EF4-FFF2-40B4-BE49-F238E27FC236}">
+                <a16:creationId xmlns:a16="http://schemas.microsoft.com/office/drawing/2014/main" id="{5175EF3B-A832-4E78-A0F9-73935F360E48}"/>
+              </a:ext>
+            </a:extLst>
+          </p:cNvPr>
+          <p:cNvSpPr txBox="1"/>
+          <p:nvPr/>
+        </p:nvSpPr>
+        <p:spPr>
+          <a:xfrm>
+            <a:off x="886848" y="4279440"/>
+            <a:ext cx="3861634" cy="1200329"/>
+          </a:xfrm>
+          <a:prstGeom prst="rect">
+            <a:avLst/>
+          </a:prstGeom>
+          <a:noFill/>
+        </p:spPr>
+        <p:txBody>
+          <a:bodyPr wrap="square" rtlCol="0">
+            <a:spAutoFit/>
+          </a:bodyPr>
+          <a:lstStyle/>
+          <a:p>
+            <a:r>
+              <a:rPr lang="es-ES_tradnl" dirty="0">
+                <a:latin typeface="Century Gothic" panose="020B0502020202020204" pitchFamily="34" charset="0"/>
+              </a:rPr>
+              <a:t>Nombre del curso: Curso de PHP</a:t>
+            </a:r>
+          </a:p>
+          <a:p>
+            <a:r>
+              <a:rPr lang="es-ES_tradnl" dirty="0">
+                <a:latin typeface="Century Gothic" panose="020B0502020202020204" pitchFamily="34" charset="0"/>
+              </a:rPr>
+              <a:t>Duración: 150 horas</a:t>
+            </a:r>
+          </a:p>
+          <a:p>
+            <a:r>
+              <a:rPr lang="es-ES_tradnl" dirty="0">
+                <a:latin typeface="Century Gothic" panose="020B0502020202020204" pitchFamily="34" charset="0"/>
+              </a:rPr>
+              <a:t>Posibilidad de prácticas: sí</a:t>
+            </a:r>
+          </a:p>
+          <a:p>
+            <a:r>
+              <a:rPr lang="es-ES_tradnl" dirty="0">
+                <a:latin typeface="Century Gothic" panose="020B0502020202020204" pitchFamily="34" charset="0"/>
+              </a:rPr>
+              <a:t>Precio: no disponible</a:t>
+            </a:r>
+          </a:p>
+        </p:txBody>
+      </p:sp>
+      <p:sp>
+        <p:nvSpPr>
+          <p:cNvPr id="8" name="CuadroTexto 7">
+            <a:extLst>
+              <a:ext uri="{FF2B5EF4-FFF2-40B4-BE49-F238E27FC236}">
+                <a16:creationId xmlns:a16="http://schemas.microsoft.com/office/drawing/2014/main" id="{E75E218B-53B7-4064-8E29-883B63255122}"/>
+              </a:ext>
+            </a:extLst>
+          </p:cNvPr>
+          <p:cNvSpPr txBox="1"/>
+          <p:nvPr/>
+        </p:nvSpPr>
+        <p:spPr>
+          <a:xfrm>
+            <a:off x="4748482" y="4744414"/>
+            <a:ext cx="3548925" cy="1754326"/>
+          </a:xfrm>
+          <a:prstGeom prst="rect">
+            <a:avLst/>
+          </a:prstGeom>
+          <a:noFill/>
+        </p:spPr>
+        <p:txBody>
+          <a:bodyPr wrap="square" rtlCol="0">
+            <a:spAutoFit/>
+          </a:bodyPr>
+          <a:lstStyle/>
+          <a:p>
+            <a:r>
+              <a:rPr lang="es-ES_tradnl" dirty="0">
+                <a:latin typeface="Century Gothic" panose="020B0502020202020204" pitchFamily="34" charset="0"/>
+              </a:rPr>
+              <a:t>Nombre del curso: PHP 7 Y MYSQL</a:t>
+            </a:r>
+          </a:p>
+          <a:p>
+            <a:r>
+              <a:rPr lang="es-ES_tradnl" dirty="0">
+                <a:latin typeface="Century Gothic" panose="020B0502020202020204" pitchFamily="34" charset="0"/>
+              </a:rPr>
+              <a:t>Duración: 20 horas más trabajo personal.</a:t>
+            </a:r>
+          </a:p>
+          <a:p>
+            <a:r>
+              <a:rPr lang="es-ES_tradnl" dirty="0">
+                <a:latin typeface="Century Gothic" panose="020B0502020202020204" pitchFamily="34" charset="0"/>
+              </a:rPr>
+              <a:t>Posibilidad de prácticas: no</a:t>
+            </a:r>
+          </a:p>
+          <a:p>
+            <a:r>
+              <a:rPr lang="es-ES_tradnl" dirty="0">
+                <a:latin typeface="Century Gothic" panose="020B0502020202020204" pitchFamily="34" charset="0"/>
+              </a:rPr>
+              <a:t>Precio: 15 euros</a:t>
+            </a:r>
+          </a:p>
+        </p:txBody>
+      </p:sp>
+      <p:sp>
+        <p:nvSpPr>
+          <p:cNvPr id="10" name="CuadroTexto 9">
+            <a:extLst>
+              <a:ext uri="{FF2B5EF4-FFF2-40B4-BE49-F238E27FC236}">
+                <a16:creationId xmlns:a16="http://schemas.microsoft.com/office/drawing/2014/main" id="{0BFAC37B-28B6-4F59-8A0B-4194F8B9B576}"/>
+              </a:ext>
+            </a:extLst>
+          </p:cNvPr>
+          <p:cNvSpPr txBox="1"/>
+          <p:nvPr/>
+        </p:nvSpPr>
+        <p:spPr>
+          <a:xfrm>
+            <a:off x="8297407" y="4140940"/>
+            <a:ext cx="3673136" cy="1477328"/>
+          </a:xfrm>
+          <a:prstGeom prst="rect">
+            <a:avLst/>
+          </a:prstGeom>
+          <a:noFill/>
+        </p:spPr>
+        <p:txBody>
+          <a:bodyPr wrap="square" rtlCol="0">
+            <a:spAutoFit/>
+          </a:bodyPr>
+          <a:lstStyle/>
+          <a:p>
+            <a:r>
+              <a:rPr lang="es-ES_tradnl"/>
+              <a:t>Nombre del curso: Aplicaciones web con PHP</a:t>
+            </a:r>
+          </a:p>
+          <a:p>
+            <a:r>
+              <a:rPr lang="es-ES_tradnl"/>
+              <a:t>Duración: no especificado</a:t>
+            </a:r>
+          </a:p>
+          <a:p>
+            <a:r>
+              <a:rPr lang="es-ES_tradnl"/>
+              <a:t>Posibilidad de prácticas: no</a:t>
+            </a:r>
+          </a:p>
+          <a:p>
+            <a:r>
+              <a:rPr lang="es-ES_tradnl"/>
+              <a:t>Precio: 1600 euros</a:t>
+            </a:r>
+            <a:endParaRPr lang="es-ES_tradnl" dirty="0"/>
+          </a:p>
+        </p:txBody>
+      </p:sp>
     </p:spTree>
     <p:extLst>
       <p:ext uri="{BB962C8B-B14F-4D97-AF65-F5344CB8AC3E}">
-        <p14:creationId xmlns:p14="http://schemas.microsoft.com/office/powerpoint/2010/main" val="323829413"/>
+        <p14:creationId xmlns:p14="http://schemas.microsoft.com/office/powerpoint/2010/main" val="456257309"/>
       </p:ext>
     </p:extLst>
   </p:cSld>

</xml_diff>